<commit_message>
adjusting schedule and adding TAs
</commit_message>
<xml_diff>
--- a/slides/Trees-SegmentTrees.pptx
+++ b/slides/Trees-SegmentTrees.pptx
@@ -232,7 +232,7 @@
           <a:p>
             <a:fld id="{C5B45307-6ED4-B142-BD64-10F739779302}" type="datetimeFigureOut">
               <a:rPr lang="en-US" smtClean="0"/>
-              <a:t>3/17/23</a:t>
+              <a:t>1/2/25</a:t>
             </a:fld>
             <a:endParaRPr lang="en-US"/>
           </a:p>
@@ -808,7 +808,7 @@
           <a:noFill/>
           <a:extLst>
             <a:ext uri="{909E8E84-426E-40dd-AFC4-6F175D3DCCD1}">
-              <a14:hiddenFill xmlns="" xmlns:a14="http://schemas.microsoft.com/office/drawing/2010/main">
+              <a14:hiddenFill xmlns:a14="http://schemas.microsoft.com/office/drawing/2010/main" xmlns="">
                 <a:solidFill>
                   <a:srgbClr val="FFFFFF"/>
                 </a:solidFill>
@@ -867,7 +867,7 @@
             </a:ln>
             <a:extLst>
               <a:ext uri="{91240B29-F687-4f45-9708-019B960494DF}">
-                <a14:hiddenLine xmlns="" xmlns:a14="http://schemas.microsoft.com/office/drawing/2010/main" w="9525">
+                <a14:hiddenLine xmlns:a14="http://schemas.microsoft.com/office/drawing/2010/main" xmlns="" w="9525">
                   <a:solidFill>
                     <a:srgbClr val="000000"/>
                   </a:solidFill>
@@ -957,7 +957,7 @@
             </a:ln>
             <a:extLst>
               <a:ext uri="{91240B29-F687-4f45-9708-019B960494DF}">
-                <a14:hiddenLine xmlns="" xmlns:a14="http://schemas.microsoft.com/office/drawing/2010/main" w="9525">
+                <a14:hiddenLine xmlns:a14="http://schemas.microsoft.com/office/drawing/2010/main" xmlns="" w="9525">
                   <a:solidFill>
                     <a:srgbClr val="000000"/>
                   </a:solidFill>
@@ -1047,7 +1047,7 @@
             </a:ln>
             <a:extLst>
               <a:ext uri="{91240B29-F687-4f45-9708-019B960494DF}">
-                <a14:hiddenLine xmlns="" xmlns:a14="http://schemas.microsoft.com/office/drawing/2010/main" w="9525">
+                <a14:hiddenLine xmlns:a14="http://schemas.microsoft.com/office/drawing/2010/main" xmlns="" w="9525">
                   <a:solidFill>
                     <a:srgbClr val="000000"/>
                   </a:solidFill>
@@ -1081,7 +1081,7 @@
             </a:ln>
             <a:extLst>
               <a:ext uri="{91240B29-F687-4f45-9708-019B960494DF}">
-                <a14:hiddenLine xmlns="" xmlns:a14="http://schemas.microsoft.com/office/drawing/2010/main" w="9525">
+                <a14:hiddenLine xmlns:a14="http://schemas.microsoft.com/office/drawing/2010/main" xmlns="" w="9525">
                   <a:solidFill>
                     <a:srgbClr val="000000"/>
                   </a:solidFill>
@@ -1171,7 +1171,7 @@
             </a:ln>
             <a:extLst>
               <a:ext uri="{91240B29-F687-4f45-9708-019B960494DF}">
-                <a14:hiddenLine xmlns="" xmlns:a14="http://schemas.microsoft.com/office/drawing/2010/main" w="9525">
+                <a14:hiddenLine xmlns:a14="http://schemas.microsoft.com/office/drawing/2010/main" xmlns="" w="9525">
                   <a:solidFill>
                     <a:srgbClr val="000000"/>
                   </a:solidFill>
@@ -1233,7 +1233,7 @@
             </a:ln>
             <a:extLst>
               <a:ext uri="{91240B29-F687-4f45-9708-019B960494DF}">
-                <a14:hiddenLine xmlns="" xmlns:a14="http://schemas.microsoft.com/office/drawing/2010/main" w="9525">
+                <a14:hiddenLine xmlns:a14="http://schemas.microsoft.com/office/drawing/2010/main" xmlns="" w="9525">
                   <a:solidFill>
                     <a:srgbClr val="000000"/>
                   </a:solidFill>
@@ -1295,7 +1295,7 @@
             </a:ln>
             <a:extLst>
               <a:ext uri="{91240B29-F687-4f45-9708-019B960494DF}">
-                <a14:hiddenLine xmlns="" xmlns:a14="http://schemas.microsoft.com/office/drawing/2010/main" w="9525">
+                <a14:hiddenLine xmlns:a14="http://schemas.microsoft.com/office/drawing/2010/main" xmlns="" w="9525">
                   <a:solidFill>
                     <a:srgbClr val="000000"/>
                   </a:solidFill>
@@ -1385,7 +1385,7 @@
             </a:ln>
             <a:extLst>
               <a:ext uri="{91240B29-F687-4f45-9708-019B960494DF}">
-                <a14:hiddenLine xmlns="" xmlns:a14="http://schemas.microsoft.com/office/drawing/2010/main" w="9525">
+                <a14:hiddenLine xmlns:a14="http://schemas.microsoft.com/office/drawing/2010/main" xmlns="" w="9525">
                   <a:solidFill>
                     <a:srgbClr val="000000"/>
                   </a:solidFill>
@@ -1447,7 +1447,7 @@
             </a:ln>
             <a:extLst>
               <a:ext uri="{91240B29-F687-4f45-9708-019B960494DF}">
-                <a14:hiddenLine xmlns="" xmlns:a14="http://schemas.microsoft.com/office/drawing/2010/main" w="9525">
+                <a14:hiddenLine xmlns:a14="http://schemas.microsoft.com/office/drawing/2010/main" xmlns="" w="9525">
                   <a:solidFill>
                     <a:srgbClr val="000000"/>
                   </a:solidFill>
@@ -1509,7 +1509,7 @@
             </a:ln>
             <a:extLst>
               <a:ext uri="{91240B29-F687-4f45-9708-019B960494DF}">
-                <a14:hiddenLine xmlns="" xmlns:a14="http://schemas.microsoft.com/office/drawing/2010/main" w="9525">
+                <a14:hiddenLine xmlns:a14="http://schemas.microsoft.com/office/drawing/2010/main" xmlns="" w="9525">
                   <a:solidFill>
                     <a:srgbClr val="000000"/>
                   </a:solidFill>
@@ -1599,7 +1599,7 @@
             </a:ln>
             <a:extLst>
               <a:ext uri="{91240B29-F687-4f45-9708-019B960494DF}">
-                <a14:hiddenLine xmlns="" xmlns:a14="http://schemas.microsoft.com/office/drawing/2010/main" w="9525">
+                <a14:hiddenLine xmlns:a14="http://schemas.microsoft.com/office/drawing/2010/main" xmlns="" w="9525">
                   <a:solidFill>
                     <a:srgbClr val="000000"/>
                   </a:solidFill>
@@ -1689,7 +1689,7 @@
             </a:ln>
             <a:extLst>
               <a:ext uri="{91240B29-F687-4f45-9708-019B960494DF}">
-                <a14:hiddenLine xmlns="" xmlns:a14="http://schemas.microsoft.com/office/drawing/2010/main" w="9525">
+                <a14:hiddenLine xmlns:a14="http://schemas.microsoft.com/office/drawing/2010/main" xmlns="" w="9525">
                   <a:solidFill>
                     <a:srgbClr val="000000"/>
                   </a:solidFill>
@@ -1751,7 +1751,7 @@
             </a:ln>
             <a:extLst>
               <a:ext uri="{91240B29-F687-4f45-9708-019B960494DF}">
-                <a14:hiddenLine xmlns="" xmlns:a14="http://schemas.microsoft.com/office/drawing/2010/main" w="9525">
+                <a14:hiddenLine xmlns:a14="http://schemas.microsoft.com/office/drawing/2010/main" xmlns="" w="9525">
                   <a:solidFill>
                     <a:srgbClr val="000000"/>
                   </a:solidFill>
@@ -1861,7 +1861,7 @@
             </a:ln>
             <a:extLst>
               <a:ext uri="{91240B29-F687-4f45-9708-019B960494DF}">
-                <a14:hiddenLine xmlns="" xmlns:a14="http://schemas.microsoft.com/office/drawing/2010/main" w="9525">
+                <a14:hiddenLine xmlns:a14="http://schemas.microsoft.com/office/drawing/2010/main" xmlns="" w="9525">
                   <a:solidFill>
                     <a:srgbClr val="000000"/>
                   </a:solidFill>
@@ -1923,7 +1923,7 @@
             </a:ln>
             <a:extLst>
               <a:ext uri="{91240B29-F687-4f45-9708-019B960494DF}">
-                <a14:hiddenLine xmlns="" xmlns:a14="http://schemas.microsoft.com/office/drawing/2010/main" w="9525">
+                <a14:hiddenLine xmlns:a14="http://schemas.microsoft.com/office/drawing/2010/main" xmlns="" w="9525">
                   <a:solidFill>
                     <a:srgbClr val="000000"/>
                   </a:solidFill>
@@ -2013,7 +2013,7 @@
             </a:ln>
             <a:extLst>
               <a:ext uri="{91240B29-F687-4f45-9708-019B960494DF}">
-                <a14:hiddenLine xmlns="" xmlns:a14="http://schemas.microsoft.com/office/drawing/2010/main" w="9525">
+                <a14:hiddenLine xmlns:a14="http://schemas.microsoft.com/office/drawing/2010/main" xmlns="" w="9525">
                   <a:solidFill>
                     <a:srgbClr val="000000"/>
                   </a:solidFill>
@@ -2103,7 +2103,7 @@
             </a:ln>
             <a:extLst>
               <a:ext uri="{91240B29-F687-4f45-9708-019B960494DF}">
-                <a14:hiddenLine xmlns="" xmlns:a14="http://schemas.microsoft.com/office/drawing/2010/main" w="9525">
+                <a14:hiddenLine xmlns:a14="http://schemas.microsoft.com/office/drawing/2010/main" xmlns="" w="9525">
                   <a:solidFill>
                     <a:srgbClr val="000000"/>
                   </a:solidFill>
@@ -2165,7 +2165,7 @@
             </a:ln>
             <a:extLst>
               <a:ext uri="{91240B29-F687-4f45-9708-019B960494DF}">
-                <a14:hiddenLine xmlns="" xmlns:a14="http://schemas.microsoft.com/office/drawing/2010/main" w="9525">
+                <a14:hiddenLine xmlns:a14="http://schemas.microsoft.com/office/drawing/2010/main" xmlns="" w="9525">
                   <a:solidFill>
                     <a:srgbClr val="000000"/>
                   </a:solidFill>
@@ -2255,7 +2255,7 @@
             </a:ln>
             <a:extLst>
               <a:ext uri="{91240B29-F687-4f45-9708-019B960494DF}">
-                <a14:hiddenLine xmlns="" xmlns:a14="http://schemas.microsoft.com/office/drawing/2010/main" w="9525">
+                <a14:hiddenLine xmlns:a14="http://schemas.microsoft.com/office/drawing/2010/main" xmlns="" w="9525">
                   <a:solidFill>
                     <a:srgbClr val="000000"/>
                   </a:solidFill>
@@ -2345,7 +2345,7 @@
             </a:ln>
             <a:extLst>
               <a:ext uri="{91240B29-F687-4f45-9708-019B960494DF}">
-                <a14:hiddenLine xmlns="" xmlns:a14="http://schemas.microsoft.com/office/drawing/2010/main" w="9525">
+                <a14:hiddenLine xmlns:a14="http://schemas.microsoft.com/office/drawing/2010/main" xmlns="" w="9525">
                   <a:solidFill>
                     <a:srgbClr val="000000"/>
                   </a:solidFill>
@@ -2401,7 +2401,7 @@
             </a:ln>
             <a:extLst>
               <a:ext uri="{91240B29-F687-4f45-9708-019B960494DF}">
-                <a14:hiddenLine xmlns="" xmlns:a14="http://schemas.microsoft.com/office/drawing/2010/main" w="9525">
+                <a14:hiddenLine xmlns:a14="http://schemas.microsoft.com/office/drawing/2010/main" xmlns="" w="9525">
                   <a:solidFill>
                     <a:srgbClr val="000000"/>
                   </a:solidFill>
@@ -2491,7 +2491,7 @@
             </a:ln>
             <a:extLst>
               <a:ext uri="{91240B29-F687-4f45-9708-019B960494DF}">
-                <a14:hiddenLine xmlns="" xmlns:a14="http://schemas.microsoft.com/office/drawing/2010/main" w="9525">
+                <a14:hiddenLine xmlns:a14="http://schemas.microsoft.com/office/drawing/2010/main" xmlns="" w="9525">
                   <a:solidFill>
                     <a:srgbClr val="000000"/>
                   </a:solidFill>
@@ -2547,7 +2547,7 @@
             </a:ln>
             <a:extLst>
               <a:ext uri="{91240B29-F687-4f45-9708-019B960494DF}">
-                <a14:hiddenLine xmlns="" xmlns:a14="http://schemas.microsoft.com/office/drawing/2010/main" w="9525">
+                <a14:hiddenLine xmlns:a14="http://schemas.microsoft.com/office/drawing/2010/main" xmlns="" w="9525">
                   <a:solidFill>
                     <a:srgbClr val="000000"/>
                   </a:solidFill>
@@ -2637,7 +2637,7 @@
             </a:ln>
             <a:extLst>
               <a:ext uri="{91240B29-F687-4f45-9708-019B960494DF}">
-                <a14:hiddenLine xmlns="" xmlns:a14="http://schemas.microsoft.com/office/drawing/2010/main" w="9525">
+                <a14:hiddenLine xmlns:a14="http://schemas.microsoft.com/office/drawing/2010/main" xmlns="" w="9525">
                   <a:solidFill>
                     <a:srgbClr val="000000"/>
                   </a:solidFill>
@@ -2705,7 +2705,7 @@
             </a:ln>
             <a:extLst>
               <a:ext uri="{91240B29-F687-4f45-9708-019B960494DF}">
-                <a14:hiddenLine xmlns="" xmlns:a14="http://schemas.microsoft.com/office/drawing/2010/main" w="9525">
+                <a14:hiddenLine xmlns:a14="http://schemas.microsoft.com/office/drawing/2010/main" xmlns="" w="9525">
                   <a:solidFill>
                     <a:srgbClr val="000000"/>
                   </a:solidFill>
@@ -2795,7 +2795,7 @@
             </a:ln>
             <a:extLst>
               <a:ext uri="{91240B29-F687-4f45-9708-019B960494DF}">
-                <a14:hiddenLine xmlns="" xmlns:a14="http://schemas.microsoft.com/office/drawing/2010/main" w="9525">
+                <a14:hiddenLine xmlns:a14="http://schemas.microsoft.com/office/drawing/2010/main" xmlns="" w="9525">
                   <a:solidFill>
                     <a:srgbClr val="000000"/>
                   </a:solidFill>
@@ -2863,7 +2863,7 @@
             </a:ln>
             <a:extLst>
               <a:ext uri="{91240B29-F687-4f45-9708-019B960494DF}">
-                <a14:hiddenLine xmlns="" xmlns:a14="http://schemas.microsoft.com/office/drawing/2010/main" w="9525">
+                <a14:hiddenLine xmlns:a14="http://schemas.microsoft.com/office/drawing/2010/main" xmlns="" w="9525">
                   <a:solidFill>
                     <a:srgbClr val="000000"/>
                   </a:solidFill>
@@ -2953,7 +2953,7 @@
             </a:ln>
             <a:extLst>
               <a:ext uri="{91240B29-F687-4f45-9708-019B960494DF}">
-                <a14:hiddenLine xmlns="" xmlns:a14="http://schemas.microsoft.com/office/drawing/2010/main" w="9525">
+                <a14:hiddenLine xmlns:a14="http://schemas.microsoft.com/office/drawing/2010/main" xmlns="" w="9525">
                   <a:solidFill>
                     <a:srgbClr val="000000"/>
                   </a:solidFill>
@@ -2987,7 +2987,7 @@
             </a:ln>
             <a:extLst>
               <a:ext uri="{91240B29-F687-4f45-9708-019B960494DF}">
-                <a14:hiddenLine xmlns="" xmlns:a14="http://schemas.microsoft.com/office/drawing/2010/main" w="9525">
+                <a14:hiddenLine xmlns:a14="http://schemas.microsoft.com/office/drawing/2010/main" xmlns="" w="9525">
                   <a:solidFill>
                     <a:srgbClr val="000000"/>
                   </a:solidFill>
@@ -3077,7 +3077,7 @@
             </a:ln>
             <a:extLst>
               <a:ext uri="{91240B29-F687-4f45-9708-019B960494DF}">
-                <a14:hiddenLine xmlns="" xmlns:a14="http://schemas.microsoft.com/office/drawing/2010/main" w="9525">
+                <a14:hiddenLine xmlns:a14="http://schemas.microsoft.com/office/drawing/2010/main" xmlns="" w="9525">
                   <a:solidFill>
                     <a:srgbClr val="000000"/>
                   </a:solidFill>
@@ -3139,7 +3139,7 @@
             </a:ln>
             <a:extLst>
               <a:ext uri="{91240B29-F687-4f45-9708-019B960494DF}">
-                <a14:hiddenLine xmlns="" xmlns:a14="http://schemas.microsoft.com/office/drawing/2010/main" w="9525">
+                <a14:hiddenLine xmlns:a14="http://schemas.microsoft.com/office/drawing/2010/main" xmlns="" w="9525">
                   <a:solidFill>
                     <a:srgbClr val="000000"/>
                   </a:solidFill>
@@ -3201,7 +3201,7 @@
             </a:ln>
             <a:extLst>
               <a:ext uri="{91240B29-F687-4f45-9708-019B960494DF}">
-                <a14:hiddenLine xmlns="" xmlns:a14="http://schemas.microsoft.com/office/drawing/2010/main" w="9525">
+                <a14:hiddenLine xmlns:a14="http://schemas.microsoft.com/office/drawing/2010/main" xmlns="" w="9525">
                   <a:solidFill>
                     <a:srgbClr val="000000"/>
                   </a:solidFill>
@@ -3291,7 +3291,7 @@
             </a:ln>
             <a:extLst>
               <a:ext uri="{91240B29-F687-4f45-9708-019B960494DF}">
-                <a14:hiddenLine xmlns="" xmlns:a14="http://schemas.microsoft.com/office/drawing/2010/main" w="9525">
+                <a14:hiddenLine xmlns:a14="http://schemas.microsoft.com/office/drawing/2010/main" xmlns="" w="9525">
                   <a:solidFill>
                     <a:srgbClr val="000000"/>
                   </a:solidFill>
@@ -3359,7 +3359,7 @@
             </a:ln>
             <a:extLst>
               <a:ext uri="{91240B29-F687-4f45-9708-019B960494DF}">
-                <a14:hiddenLine xmlns="" xmlns:a14="http://schemas.microsoft.com/office/drawing/2010/main" w="9525">
+                <a14:hiddenLine xmlns:a14="http://schemas.microsoft.com/office/drawing/2010/main" xmlns="" w="9525">
                   <a:solidFill>
                     <a:srgbClr val="000000"/>
                   </a:solidFill>
@@ -3421,7 +3421,7 @@
             </a:ln>
             <a:extLst>
               <a:ext uri="{91240B29-F687-4f45-9708-019B960494DF}">
-                <a14:hiddenLine xmlns="" xmlns:a14="http://schemas.microsoft.com/office/drawing/2010/main" w="9525">
+                <a14:hiddenLine xmlns:a14="http://schemas.microsoft.com/office/drawing/2010/main" xmlns="" w="9525">
                   <a:solidFill>
                     <a:srgbClr val="000000"/>
                   </a:solidFill>
@@ -3511,7 +3511,7 @@
             </a:ln>
             <a:extLst>
               <a:ext uri="{91240B29-F687-4f45-9708-019B960494DF}">
-                <a14:hiddenLine xmlns="" xmlns:a14="http://schemas.microsoft.com/office/drawing/2010/main" w="9525">
+                <a14:hiddenLine xmlns:a14="http://schemas.microsoft.com/office/drawing/2010/main" xmlns="" w="9525">
                   <a:solidFill>
                     <a:srgbClr val="000000"/>
                   </a:solidFill>
@@ -3573,7 +3573,7 @@
             </a:ln>
             <a:extLst>
               <a:ext uri="{91240B29-F687-4f45-9708-019B960494DF}">
-                <a14:hiddenLine xmlns="" xmlns:a14="http://schemas.microsoft.com/office/drawing/2010/main" w="9525">
+                <a14:hiddenLine xmlns:a14="http://schemas.microsoft.com/office/drawing/2010/main" xmlns="" w="9525">
                   <a:solidFill>
                     <a:srgbClr val="000000"/>
                   </a:solidFill>
@@ -3663,7 +3663,7 @@
             </a:ln>
             <a:extLst>
               <a:ext uri="{91240B29-F687-4f45-9708-019B960494DF}">
-                <a14:hiddenLine xmlns="" xmlns:a14="http://schemas.microsoft.com/office/drawing/2010/main" w="9525">
+                <a14:hiddenLine xmlns:a14="http://schemas.microsoft.com/office/drawing/2010/main" xmlns="" w="9525">
                   <a:solidFill>
                     <a:srgbClr val="000000"/>
                   </a:solidFill>
@@ -3725,7 +3725,7 @@
             </a:ln>
             <a:extLst>
               <a:ext uri="{91240B29-F687-4f45-9708-019B960494DF}">
-                <a14:hiddenLine xmlns="" xmlns:a14="http://schemas.microsoft.com/office/drawing/2010/main" w="9525">
+                <a14:hiddenLine xmlns:a14="http://schemas.microsoft.com/office/drawing/2010/main" xmlns="" w="9525">
                   <a:solidFill>
                     <a:srgbClr val="000000"/>
                   </a:solidFill>
@@ -3815,7 +3815,7 @@
             </a:ln>
             <a:extLst>
               <a:ext uri="{91240B29-F687-4f45-9708-019B960494DF}">
-                <a14:hiddenLine xmlns="" xmlns:a14="http://schemas.microsoft.com/office/drawing/2010/main" w="9525">
+                <a14:hiddenLine xmlns:a14="http://schemas.microsoft.com/office/drawing/2010/main" xmlns="" w="9525">
                   <a:solidFill>
                     <a:srgbClr val="000000"/>
                   </a:solidFill>
@@ -3849,7 +3849,7 @@
             </a:ln>
             <a:extLst>
               <a:ext uri="{91240B29-F687-4f45-9708-019B960494DF}">
-                <a14:hiddenLine xmlns="" xmlns:a14="http://schemas.microsoft.com/office/drawing/2010/main" w="9525">
+                <a14:hiddenLine xmlns:a14="http://schemas.microsoft.com/office/drawing/2010/main" xmlns="" w="9525">
                   <a:solidFill>
                     <a:srgbClr val="000000"/>
                   </a:solidFill>
@@ -3914,7 +3914,7 @@
             </a:ln>
             <a:extLst>
               <a:ext uri="{91240B29-F687-4f45-9708-019B960494DF}">
-                <a14:hiddenLine xmlns="" xmlns:a14="http://schemas.microsoft.com/office/drawing/2010/main" w="9525">
+                <a14:hiddenLine xmlns:a14="http://schemas.microsoft.com/office/drawing/2010/main" xmlns="" w="9525">
                   <a:solidFill>
                     <a:srgbClr val="000000"/>
                   </a:solidFill>
@@ -4004,7 +4004,7 @@
             </a:ln>
             <a:extLst>
               <a:ext uri="{91240B29-F687-4f45-9708-019B960494DF}">
-                <a14:hiddenLine xmlns="" xmlns:a14="http://schemas.microsoft.com/office/drawing/2010/main" w="9525">
+                <a14:hiddenLine xmlns:a14="http://schemas.microsoft.com/office/drawing/2010/main" xmlns="" w="9525">
                   <a:solidFill>
                     <a:srgbClr val="000000"/>
                   </a:solidFill>
@@ -4066,7 +4066,7 @@
             </a:ln>
             <a:extLst>
               <a:ext uri="{91240B29-F687-4f45-9708-019B960494DF}">
-                <a14:hiddenLine xmlns="" xmlns:a14="http://schemas.microsoft.com/office/drawing/2010/main" w="9525">
+                <a14:hiddenLine xmlns:a14="http://schemas.microsoft.com/office/drawing/2010/main" xmlns="" w="9525">
                   <a:solidFill>
                     <a:srgbClr val="000000"/>
                   </a:solidFill>
@@ -4156,7 +4156,7 @@
             </a:ln>
             <a:extLst>
               <a:ext uri="{91240B29-F687-4f45-9708-019B960494DF}">
-                <a14:hiddenLine xmlns="" xmlns:a14="http://schemas.microsoft.com/office/drawing/2010/main" w="9525">
+                <a14:hiddenLine xmlns:a14="http://schemas.microsoft.com/office/drawing/2010/main" xmlns="" w="9525">
                   <a:solidFill>
                     <a:srgbClr val="000000"/>
                   </a:solidFill>
@@ -4246,7 +4246,7 @@
             </a:ln>
             <a:extLst>
               <a:ext uri="{91240B29-F687-4f45-9708-019B960494DF}">
-                <a14:hiddenLine xmlns="" xmlns:a14="http://schemas.microsoft.com/office/drawing/2010/main" w="9525">
+                <a14:hiddenLine xmlns:a14="http://schemas.microsoft.com/office/drawing/2010/main" xmlns="" w="9525">
                   <a:solidFill>
                     <a:srgbClr val="000000"/>
                   </a:solidFill>
@@ -4311,7 +4311,7 @@
             </a:ln>
             <a:extLst>
               <a:ext uri="{91240B29-F687-4f45-9708-019B960494DF}">
-                <a14:hiddenLine xmlns="" xmlns:a14="http://schemas.microsoft.com/office/drawing/2010/main" w="9525">
+                <a14:hiddenLine xmlns:a14="http://schemas.microsoft.com/office/drawing/2010/main" xmlns="" w="9525">
                   <a:solidFill>
                     <a:srgbClr val="000000"/>
                   </a:solidFill>
@@ -4373,7 +4373,7 @@
             </a:ln>
             <a:extLst>
               <a:ext uri="{91240B29-F687-4f45-9708-019B960494DF}">
-                <a14:hiddenLine xmlns="" xmlns:a14="http://schemas.microsoft.com/office/drawing/2010/main" w="9525">
+                <a14:hiddenLine xmlns:a14="http://schemas.microsoft.com/office/drawing/2010/main" xmlns="" w="9525">
                   <a:solidFill>
                     <a:srgbClr val="000000"/>
                   </a:solidFill>
@@ -4463,7 +4463,7 @@
             </a:ln>
             <a:extLst>
               <a:ext uri="{91240B29-F687-4f45-9708-019B960494DF}">
-                <a14:hiddenLine xmlns="" xmlns:a14="http://schemas.microsoft.com/office/drawing/2010/main" w="9525">
+                <a14:hiddenLine xmlns:a14="http://schemas.microsoft.com/office/drawing/2010/main" xmlns="" w="9525">
                   <a:solidFill>
                     <a:srgbClr val="000000"/>
                   </a:solidFill>
@@ -4553,7 +4553,7 @@
             </a:ln>
             <a:extLst>
               <a:ext uri="{91240B29-F687-4f45-9708-019B960494DF}">
-                <a14:hiddenLine xmlns="" xmlns:a14="http://schemas.microsoft.com/office/drawing/2010/main" w="9525">
+                <a14:hiddenLine xmlns:a14="http://schemas.microsoft.com/office/drawing/2010/main" xmlns="" w="9525">
                   <a:solidFill>
                     <a:srgbClr val="000000"/>
                   </a:solidFill>
@@ -4615,7 +4615,7 @@
             </a:ln>
             <a:extLst>
               <a:ext uri="{91240B29-F687-4f45-9708-019B960494DF}">
-                <a14:hiddenLine xmlns="" xmlns:a14="http://schemas.microsoft.com/office/drawing/2010/main" w="9525">
+                <a14:hiddenLine xmlns:a14="http://schemas.microsoft.com/office/drawing/2010/main" xmlns="" w="9525">
                   <a:solidFill>
                     <a:srgbClr val="000000"/>
                   </a:solidFill>
@@ -4735,7 +4735,7 @@
             </a:ln>
             <a:extLst>
               <a:ext uri="{91240B29-F687-4f45-9708-019B960494DF}">
-                <a14:hiddenLine xmlns="" xmlns:a14="http://schemas.microsoft.com/office/drawing/2010/main" w="9525">
+                <a14:hiddenLine xmlns:a14="http://schemas.microsoft.com/office/drawing/2010/main" xmlns="" w="9525">
                   <a:solidFill>
                     <a:srgbClr val="000000"/>
                   </a:solidFill>
@@ -4803,7 +4803,7 @@
             </a:ln>
             <a:extLst>
               <a:ext uri="{91240B29-F687-4f45-9708-019B960494DF}">
-                <a14:hiddenLine xmlns="" xmlns:a14="http://schemas.microsoft.com/office/drawing/2010/main" w="9525">
+                <a14:hiddenLine xmlns:a14="http://schemas.microsoft.com/office/drawing/2010/main" xmlns="" w="9525">
                   <a:solidFill>
                     <a:srgbClr val="000000"/>
                   </a:solidFill>
@@ -4893,7 +4893,7 @@
             </a:ln>
             <a:extLst>
               <a:ext uri="{91240B29-F687-4f45-9708-019B960494DF}">
-                <a14:hiddenLine xmlns="" xmlns:a14="http://schemas.microsoft.com/office/drawing/2010/main" w="9525">
+                <a14:hiddenLine xmlns:a14="http://schemas.microsoft.com/office/drawing/2010/main" xmlns="" w="9525">
                   <a:solidFill>
                     <a:srgbClr val="000000"/>
                   </a:solidFill>
@@ -5033,7 +5033,7 @@
           <a:p>
             <a:fld id="{EC4347D3-4C9A-C240-8F14-750059DFEEB0}" type="datetimeFigureOut">
               <a:rPr lang="en-US" smtClean="0"/>
-              <a:t>3/17/23</a:t>
+              <a:t>1/2/25</a:t>
             </a:fld>
             <a:endParaRPr lang="en-US"/>
           </a:p>
@@ -5300,7 +5300,7 @@
           <a:p>
             <a:fld id="{EC4347D3-4C9A-C240-8F14-750059DFEEB0}" type="datetimeFigureOut">
               <a:rPr lang="en-US" smtClean="0"/>
-              <a:t>3/17/23</a:t>
+              <a:t>1/2/25</a:t>
             </a:fld>
             <a:endParaRPr lang="en-US"/>
           </a:p>
@@ -5496,7 +5496,7 @@
           <a:p>
             <a:fld id="{EC4347D3-4C9A-C240-8F14-750059DFEEB0}" type="datetimeFigureOut">
               <a:rPr lang="en-US" smtClean="0"/>
-              <a:t>3/17/23</a:t>
+              <a:t>1/2/25</a:t>
             </a:fld>
             <a:endParaRPr lang="en-US"/>
           </a:p>
@@ -5759,7 +5759,7 @@
           <a:p>
             <a:fld id="{EC4347D3-4C9A-C240-8F14-750059DFEEB0}" type="datetimeFigureOut">
               <a:rPr lang="en-US" smtClean="0"/>
-              <a:t>3/17/23</a:t>
+              <a:t>1/2/25</a:t>
             </a:fld>
             <a:endParaRPr lang="en-US"/>
           </a:p>
@@ -6193,7 +6193,7 @@
           <a:p>
             <a:fld id="{EC4347D3-4C9A-C240-8F14-750059DFEEB0}" type="datetimeFigureOut">
               <a:rPr lang="en-US" smtClean="0"/>
-              <a:t>3/17/23</a:t>
+              <a:t>1/2/25</a:t>
             </a:fld>
             <a:endParaRPr lang="en-US"/>
           </a:p>
@@ -6739,7 +6739,7 @@
           <a:p>
             <a:fld id="{EC4347D3-4C9A-C240-8F14-750059DFEEB0}" type="datetimeFigureOut">
               <a:rPr lang="en-US" smtClean="0"/>
-              <a:t>3/17/23</a:t>
+              <a:t>1/2/25</a:t>
             </a:fld>
             <a:endParaRPr lang="en-US"/>
           </a:p>
@@ -7459,7 +7459,7 @@
           <a:p>
             <a:fld id="{EC4347D3-4C9A-C240-8F14-750059DFEEB0}" type="datetimeFigureOut">
               <a:rPr lang="en-US" smtClean="0"/>
-              <a:t>3/17/23</a:t>
+              <a:t>1/2/25</a:t>
             </a:fld>
             <a:endParaRPr lang="en-US"/>
           </a:p>
@@ -7629,7 +7629,7 @@
           <a:p>
             <a:fld id="{EC4347D3-4C9A-C240-8F14-750059DFEEB0}" type="datetimeFigureOut">
               <a:rPr lang="en-US" smtClean="0"/>
-              <a:t>3/17/23</a:t>
+              <a:t>1/2/25</a:t>
             </a:fld>
             <a:endParaRPr lang="en-US"/>
           </a:p>
@@ -7809,7 +7809,7 @@
           <a:p>
             <a:fld id="{EC4347D3-4C9A-C240-8F14-750059DFEEB0}" type="datetimeFigureOut">
               <a:rPr lang="en-US" smtClean="0"/>
-              <a:t>3/17/23</a:t>
+              <a:t>1/2/25</a:t>
             </a:fld>
             <a:endParaRPr lang="en-US"/>
           </a:p>
@@ -7979,7 +7979,7 @@
           <a:p>
             <a:fld id="{EC4347D3-4C9A-C240-8F14-750059DFEEB0}" type="datetimeFigureOut">
               <a:rPr lang="en-US" smtClean="0"/>
-              <a:t>3/17/23</a:t>
+              <a:t>1/2/25</a:t>
             </a:fld>
             <a:endParaRPr lang="en-US"/>
           </a:p>
@@ -8229,7 +8229,7 @@
           <a:p>
             <a:fld id="{EC4347D3-4C9A-C240-8F14-750059DFEEB0}" type="datetimeFigureOut">
               <a:rPr lang="en-US" smtClean="0"/>
-              <a:t>3/17/23</a:t>
+              <a:t>1/2/25</a:t>
             </a:fld>
             <a:endParaRPr lang="en-US"/>
           </a:p>
@@ -8461,7 +8461,7 @@
           <a:p>
             <a:fld id="{EC4347D3-4C9A-C240-8F14-750059DFEEB0}" type="datetimeFigureOut">
               <a:rPr lang="en-US" smtClean="0"/>
-              <a:t>3/17/23</a:t>
+              <a:t>1/2/25</a:t>
             </a:fld>
             <a:endParaRPr lang="en-US"/>
           </a:p>
@@ -8847,7 +8847,7 @@
           <a:p>
             <a:fld id="{EC4347D3-4C9A-C240-8F14-750059DFEEB0}" type="datetimeFigureOut">
               <a:rPr lang="en-US" smtClean="0"/>
-              <a:t>3/17/23</a:t>
+              <a:t>1/2/25</a:t>
             </a:fld>
             <a:endParaRPr lang="en-US"/>
           </a:p>
@@ -8970,7 +8970,7 @@
           <a:p>
             <a:fld id="{EC4347D3-4C9A-C240-8F14-750059DFEEB0}" type="datetimeFigureOut">
               <a:rPr lang="en-US" smtClean="0"/>
-              <a:t>3/17/23</a:t>
+              <a:t>1/2/25</a:t>
             </a:fld>
             <a:endParaRPr lang="en-US"/>
           </a:p>
@@ -9065,7 +9065,7 @@
           <a:p>
             <a:fld id="{EC4347D3-4C9A-C240-8F14-750059DFEEB0}" type="datetimeFigureOut">
               <a:rPr lang="en-US" smtClean="0"/>
-              <a:t>3/17/23</a:t>
+              <a:t>1/2/25</a:t>
             </a:fld>
             <a:endParaRPr lang="en-US"/>
           </a:p>
@@ -9314,7 +9314,7 @@
           <a:p>
             <a:fld id="{EC4347D3-4C9A-C240-8F14-750059DFEEB0}" type="datetimeFigureOut">
               <a:rPr lang="en-US" smtClean="0"/>
-              <a:t>3/17/23</a:t>
+              <a:t>1/2/25</a:t>
             </a:fld>
             <a:endParaRPr lang="en-US"/>
           </a:p>
@@ -9599,7 +9599,7 @@
           <a:p>
             <a:fld id="{EC4347D3-4C9A-C240-8F14-750059DFEEB0}" type="datetimeFigureOut">
               <a:rPr lang="en-US" smtClean="0"/>
-              <a:t>3/17/23</a:t>
+              <a:t>1/2/25</a:t>
             </a:fld>
             <a:endParaRPr lang="en-US"/>
           </a:p>
@@ -9722,7 +9722,7 @@
           <a:noFill/>
           <a:extLst>
             <a:ext uri="{909E8E84-426E-40dd-AFC4-6F175D3DCCD1}">
-              <a14:hiddenFill xmlns="" xmlns:a14="http://schemas.microsoft.com/office/drawing/2010/main">
+              <a14:hiddenFill xmlns:a14="http://schemas.microsoft.com/office/drawing/2010/main" xmlns="">
                 <a:solidFill>
                   <a:srgbClr val="FFFFFF"/>
                 </a:solidFill>
@@ -9796,7 +9796,7 @@
               </a:ln>
               <a:extLst>
                 <a:ext uri="{91240B29-F687-4f45-9708-019B960494DF}">
-                  <a14:hiddenLine xmlns="" xmlns:a14="http://schemas.microsoft.com/office/drawing/2010/main" w="9525">
+                  <a14:hiddenLine xmlns:a14="http://schemas.microsoft.com/office/drawing/2010/main" xmlns="" w="9525">
                     <a:solidFill>
                       <a:srgbClr val="000000"/>
                     </a:solidFill>
@@ -9886,7 +9886,7 @@
               </a:ln>
               <a:extLst>
                 <a:ext uri="{91240B29-F687-4f45-9708-019B960494DF}">
-                  <a14:hiddenLine xmlns="" xmlns:a14="http://schemas.microsoft.com/office/drawing/2010/main" w="9525">
+                  <a14:hiddenLine xmlns:a14="http://schemas.microsoft.com/office/drawing/2010/main" xmlns="" w="9525">
                     <a:solidFill>
                       <a:srgbClr val="000000"/>
                     </a:solidFill>
@@ -9976,7 +9976,7 @@
               </a:ln>
               <a:extLst>
                 <a:ext uri="{91240B29-F687-4f45-9708-019B960494DF}">
-                  <a14:hiddenLine xmlns="" xmlns:a14="http://schemas.microsoft.com/office/drawing/2010/main" w="9525">
+                  <a14:hiddenLine xmlns:a14="http://schemas.microsoft.com/office/drawing/2010/main" xmlns="" w="9525">
                     <a:solidFill>
                       <a:srgbClr val="000000"/>
                     </a:solidFill>
@@ -10038,7 +10038,7 @@
               </a:ln>
               <a:extLst>
                 <a:ext uri="{91240B29-F687-4f45-9708-019B960494DF}">
-                  <a14:hiddenLine xmlns="" xmlns:a14="http://schemas.microsoft.com/office/drawing/2010/main" w="9525">
+                  <a14:hiddenLine xmlns:a14="http://schemas.microsoft.com/office/drawing/2010/main" xmlns="" w="9525">
                     <a:solidFill>
                       <a:srgbClr val="000000"/>
                     </a:solidFill>
@@ -10128,7 +10128,7 @@
               </a:ln>
               <a:extLst>
                 <a:ext uri="{91240B29-F687-4f45-9708-019B960494DF}">
-                  <a14:hiddenLine xmlns="" xmlns:a14="http://schemas.microsoft.com/office/drawing/2010/main" w="9525">
+                  <a14:hiddenLine xmlns:a14="http://schemas.microsoft.com/office/drawing/2010/main" xmlns="" w="9525">
                     <a:solidFill>
                       <a:srgbClr val="000000"/>
                     </a:solidFill>
@@ -10190,7 +10190,7 @@
               </a:ln>
               <a:extLst>
                 <a:ext uri="{91240B29-F687-4f45-9708-019B960494DF}">
-                  <a14:hiddenLine xmlns="" xmlns:a14="http://schemas.microsoft.com/office/drawing/2010/main" w="9525">
+                  <a14:hiddenLine xmlns:a14="http://schemas.microsoft.com/office/drawing/2010/main" xmlns="" w="9525">
                     <a:solidFill>
                       <a:srgbClr val="000000"/>
                     </a:solidFill>
@@ -10252,7 +10252,7 @@
               </a:ln>
               <a:extLst>
                 <a:ext uri="{91240B29-F687-4f45-9708-019B960494DF}">
-                  <a14:hiddenLine xmlns="" xmlns:a14="http://schemas.microsoft.com/office/drawing/2010/main" w="9525">
+                  <a14:hiddenLine xmlns:a14="http://schemas.microsoft.com/office/drawing/2010/main" xmlns="" w="9525">
                     <a:solidFill>
                       <a:srgbClr val="000000"/>
                     </a:solidFill>
@@ -10342,7 +10342,7 @@
               </a:ln>
               <a:extLst>
                 <a:ext uri="{91240B29-F687-4f45-9708-019B960494DF}">
-                  <a14:hiddenLine xmlns="" xmlns:a14="http://schemas.microsoft.com/office/drawing/2010/main" w="9525">
+                  <a14:hiddenLine xmlns:a14="http://schemas.microsoft.com/office/drawing/2010/main" xmlns="" w="9525">
                     <a:solidFill>
                       <a:srgbClr val="000000"/>
                     </a:solidFill>
@@ -10432,7 +10432,7 @@
               </a:ln>
               <a:extLst>
                 <a:ext uri="{91240B29-F687-4f45-9708-019B960494DF}">
-                  <a14:hiddenLine xmlns="" xmlns:a14="http://schemas.microsoft.com/office/drawing/2010/main" w="9525">
+                  <a14:hiddenLine xmlns:a14="http://schemas.microsoft.com/office/drawing/2010/main" xmlns="" w="9525">
                     <a:solidFill>
                       <a:srgbClr val="000000"/>
                     </a:solidFill>
@@ -10494,7 +10494,7 @@
               </a:ln>
               <a:extLst>
                 <a:ext uri="{91240B29-F687-4f45-9708-019B960494DF}">
-                  <a14:hiddenLine xmlns="" xmlns:a14="http://schemas.microsoft.com/office/drawing/2010/main" w="9525">
+                  <a14:hiddenLine xmlns:a14="http://schemas.microsoft.com/office/drawing/2010/main" xmlns="" w="9525">
                     <a:solidFill>
                       <a:srgbClr val="000000"/>
                     </a:solidFill>
@@ -10604,7 +10604,7 @@
               </a:ln>
               <a:extLst>
                 <a:ext uri="{91240B29-F687-4f45-9708-019B960494DF}">
-                  <a14:hiddenLine xmlns="" xmlns:a14="http://schemas.microsoft.com/office/drawing/2010/main" w="9525">
+                  <a14:hiddenLine xmlns:a14="http://schemas.microsoft.com/office/drawing/2010/main" xmlns="" w="9525">
                     <a:solidFill>
                       <a:srgbClr val="000000"/>
                     </a:solidFill>
@@ -10688,7 +10688,7 @@
               </a:ln>
               <a:extLst>
                 <a:ext uri="{91240B29-F687-4f45-9708-019B960494DF}">
-                  <a14:hiddenLine xmlns="" xmlns:a14="http://schemas.microsoft.com/office/drawing/2010/main" w="9525">
+                  <a14:hiddenLine xmlns:a14="http://schemas.microsoft.com/office/drawing/2010/main" xmlns="" w="9525">
                     <a:solidFill>
                       <a:srgbClr val="000000"/>
                     </a:solidFill>
@@ -10750,7 +10750,7 @@
               </a:ln>
               <a:extLst>
                 <a:ext uri="{91240B29-F687-4f45-9708-019B960494DF}">
-                  <a14:hiddenLine xmlns="" xmlns:a14="http://schemas.microsoft.com/office/drawing/2010/main" w="9525">
+                  <a14:hiddenLine xmlns:a14="http://schemas.microsoft.com/office/drawing/2010/main" xmlns="" w="9525">
                     <a:solidFill>
                       <a:srgbClr val="000000"/>
                     </a:solidFill>
@@ -10812,7 +10812,7 @@
               </a:ln>
               <a:extLst>
                 <a:ext uri="{91240B29-F687-4f45-9708-019B960494DF}">
-                  <a14:hiddenLine xmlns="" xmlns:a14="http://schemas.microsoft.com/office/drawing/2010/main" w="9525">
+                  <a14:hiddenLine xmlns:a14="http://schemas.microsoft.com/office/drawing/2010/main" xmlns="" w="9525">
                     <a:solidFill>
                       <a:srgbClr val="000000"/>
                     </a:solidFill>
@@ -10902,7 +10902,7 @@
               </a:ln>
               <a:extLst>
                 <a:ext uri="{91240B29-F687-4f45-9708-019B960494DF}">
-                  <a14:hiddenLine xmlns="" xmlns:a14="http://schemas.microsoft.com/office/drawing/2010/main" w="9525">
+                  <a14:hiddenLine xmlns:a14="http://schemas.microsoft.com/office/drawing/2010/main" xmlns="" w="9525">
                     <a:solidFill>
                       <a:srgbClr val="000000"/>
                     </a:solidFill>
@@ -10936,7 +10936,7 @@
               </a:ln>
               <a:extLst>
                 <a:ext uri="{91240B29-F687-4f45-9708-019B960494DF}">
-                  <a14:hiddenLine xmlns="" xmlns:a14="http://schemas.microsoft.com/office/drawing/2010/main" w="9525">
+                  <a14:hiddenLine xmlns:a14="http://schemas.microsoft.com/office/drawing/2010/main" xmlns="" w="9525">
                     <a:solidFill>
                       <a:srgbClr val="000000"/>
                     </a:solidFill>
@@ -11001,7 +11001,7 @@
               </a:ln>
               <a:extLst>
                 <a:ext uri="{91240B29-F687-4f45-9708-019B960494DF}">
-                  <a14:hiddenLine xmlns="" xmlns:a14="http://schemas.microsoft.com/office/drawing/2010/main" w="9525">
+                  <a14:hiddenLine xmlns:a14="http://schemas.microsoft.com/office/drawing/2010/main" xmlns="" w="9525">
                     <a:solidFill>
                       <a:srgbClr val="000000"/>
                     </a:solidFill>
@@ -11091,7 +11091,7 @@
               </a:ln>
               <a:extLst>
                 <a:ext uri="{91240B29-F687-4f45-9708-019B960494DF}">
-                  <a14:hiddenLine xmlns="" xmlns:a14="http://schemas.microsoft.com/office/drawing/2010/main" w="9525">
+                  <a14:hiddenLine xmlns:a14="http://schemas.microsoft.com/office/drawing/2010/main" xmlns="" w="9525">
                     <a:solidFill>
                       <a:srgbClr val="000000"/>
                     </a:solidFill>
@@ -11153,7 +11153,7 @@
               </a:ln>
               <a:extLst>
                 <a:ext uri="{91240B29-F687-4f45-9708-019B960494DF}">
-                  <a14:hiddenLine xmlns="" xmlns:a14="http://schemas.microsoft.com/office/drawing/2010/main" w="9525">
+                  <a14:hiddenLine xmlns:a14="http://schemas.microsoft.com/office/drawing/2010/main" xmlns="" w="9525">
                     <a:solidFill>
                       <a:srgbClr val="000000"/>
                     </a:solidFill>
@@ -11243,7 +11243,7 @@
               </a:ln>
               <a:extLst>
                 <a:ext uri="{91240B29-F687-4f45-9708-019B960494DF}">
-                  <a14:hiddenLine xmlns="" xmlns:a14="http://schemas.microsoft.com/office/drawing/2010/main" w="9525">
+                  <a14:hiddenLine xmlns:a14="http://schemas.microsoft.com/office/drawing/2010/main" xmlns="" w="9525">
                     <a:solidFill>
                       <a:srgbClr val="000000"/>
                     </a:solidFill>
@@ -11308,7 +11308,7 @@
               </a:ln>
               <a:extLst>
                 <a:ext uri="{91240B29-F687-4f45-9708-019B960494DF}">
-                  <a14:hiddenLine xmlns="" xmlns:a14="http://schemas.microsoft.com/office/drawing/2010/main" w="9525">
+                  <a14:hiddenLine xmlns:a14="http://schemas.microsoft.com/office/drawing/2010/main" xmlns="" w="9525">
                     <a:solidFill>
                       <a:srgbClr val="000000"/>
                     </a:solidFill>
@@ -11370,7 +11370,7 @@
               </a:ln>
               <a:extLst>
                 <a:ext uri="{91240B29-F687-4f45-9708-019B960494DF}">
-                  <a14:hiddenLine xmlns="" xmlns:a14="http://schemas.microsoft.com/office/drawing/2010/main" w="9525">
+                  <a14:hiddenLine xmlns:a14="http://schemas.microsoft.com/office/drawing/2010/main" xmlns="" w="9525">
                     <a:solidFill>
                       <a:srgbClr val="000000"/>
                     </a:solidFill>
@@ -11460,7 +11460,7 @@
               </a:ln>
               <a:extLst>
                 <a:ext uri="{91240B29-F687-4f45-9708-019B960494DF}">
-                  <a14:hiddenLine xmlns="" xmlns:a14="http://schemas.microsoft.com/office/drawing/2010/main" w="9525">
+                  <a14:hiddenLine xmlns:a14="http://schemas.microsoft.com/office/drawing/2010/main" xmlns="" w="9525">
                     <a:solidFill>
                       <a:srgbClr val="000000"/>
                     </a:solidFill>
@@ -11550,7 +11550,7 @@
               </a:ln>
               <a:extLst>
                 <a:ext uri="{91240B29-F687-4f45-9708-019B960494DF}">
-                  <a14:hiddenLine xmlns="" xmlns:a14="http://schemas.microsoft.com/office/drawing/2010/main" w="9525">
+                  <a14:hiddenLine xmlns:a14="http://schemas.microsoft.com/office/drawing/2010/main" xmlns="" w="9525">
                     <a:solidFill>
                       <a:srgbClr val="000000"/>
                     </a:solidFill>
@@ -11615,7 +11615,7 @@
               </a:ln>
               <a:extLst>
                 <a:ext uri="{91240B29-F687-4f45-9708-019B960494DF}">
-                  <a14:hiddenLine xmlns="" xmlns:a14="http://schemas.microsoft.com/office/drawing/2010/main" w="9525">
+                  <a14:hiddenLine xmlns:a14="http://schemas.microsoft.com/office/drawing/2010/main" xmlns="" w="9525">
                     <a:solidFill>
                       <a:srgbClr val="000000"/>
                     </a:solidFill>
@@ -11735,7 +11735,7 @@
               </a:ln>
               <a:extLst>
                 <a:ext uri="{91240B29-F687-4f45-9708-019B960494DF}">
-                  <a14:hiddenLine xmlns="" xmlns:a14="http://schemas.microsoft.com/office/drawing/2010/main" w="9525">
+                  <a14:hiddenLine xmlns:a14="http://schemas.microsoft.com/office/drawing/2010/main" xmlns="" w="9525">
                     <a:solidFill>
                       <a:srgbClr val="000000"/>
                     </a:solidFill>
@@ -11816,7 +11816,7 @@
               </a:ln>
               <a:extLst>
                 <a:ext uri="{91240B29-F687-4f45-9708-019B960494DF}">
-                  <a14:hiddenLine xmlns="" xmlns:a14="http://schemas.microsoft.com/office/drawing/2010/main" w="9525">
+                  <a14:hiddenLine xmlns:a14="http://schemas.microsoft.com/office/drawing/2010/main" xmlns="" w="9525">
                     <a:solidFill>
                       <a:srgbClr val="000000"/>
                     </a:solidFill>
@@ -11931,7 +11931,7 @@
               </a:ln>
               <a:extLst>
                 <a:ext uri="{91240B29-F687-4f45-9708-019B960494DF}">
-                  <a14:hiddenLine xmlns="" xmlns:a14="http://schemas.microsoft.com/office/drawing/2010/main" w="9525">
+                  <a14:hiddenLine xmlns:a14="http://schemas.microsoft.com/office/drawing/2010/main" xmlns="" w="9525">
                     <a:solidFill>
                       <a:srgbClr val="000000"/>
                     </a:solidFill>
@@ -12021,7 +12021,7 @@
               </a:ln>
               <a:extLst>
                 <a:ext uri="{91240B29-F687-4f45-9708-019B960494DF}">
-                  <a14:hiddenLine xmlns="" xmlns:a14="http://schemas.microsoft.com/office/drawing/2010/main" w="9525">
+                  <a14:hiddenLine xmlns:a14="http://schemas.microsoft.com/office/drawing/2010/main" xmlns="" w="9525">
                     <a:solidFill>
                       <a:srgbClr val="000000"/>
                     </a:solidFill>
@@ -12086,7 +12086,7 @@
               </a:ln>
               <a:extLst>
                 <a:ext uri="{91240B29-F687-4f45-9708-019B960494DF}">
-                  <a14:hiddenLine xmlns="" xmlns:a14="http://schemas.microsoft.com/office/drawing/2010/main" w="9525">
+                  <a14:hiddenLine xmlns:a14="http://schemas.microsoft.com/office/drawing/2010/main" xmlns="" w="9525">
                     <a:solidFill>
                       <a:srgbClr val="000000"/>
                     </a:solidFill>
@@ -12176,7 +12176,7 @@
               </a:ln>
               <a:extLst>
                 <a:ext uri="{91240B29-F687-4f45-9708-019B960494DF}">
-                  <a14:hiddenLine xmlns="" xmlns:a14="http://schemas.microsoft.com/office/drawing/2010/main" w="9525">
+                  <a14:hiddenLine xmlns:a14="http://schemas.microsoft.com/office/drawing/2010/main" xmlns="" w="9525">
                     <a:solidFill>
                       <a:srgbClr val="000000"/>
                     </a:solidFill>
@@ -12244,7 +12244,7 @@
               </a:ln>
               <a:extLst>
                 <a:ext uri="{91240B29-F687-4f45-9708-019B960494DF}">
-                  <a14:hiddenLine xmlns="" xmlns:a14="http://schemas.microsoft.com/office/drawing/2010/main" w="9525">
+                  <a14:hiddenLine xmlns:a14="http://schemas.microsoft.com/office/drawing/2010/main" xmlns="" w="9525">
                     <a:solidFill>
                       <a:srgbClr val="000000"/>
                     </a:solidFill>
@@ -12334,7 +12334,7 @@
               </a:ln>
               <a:extLst>
                 <a:ext uri="{91240B29-F687-4f45-9708-019B960494DF}">
-                  <a14:hiddenLine xmlns="" xmlns:a14="http://schemas.microsoft.com/office/drawing/2010/main" w="9525">
+                  <a14:hiddenLine xmlns:a14="http://schemas.microsoft.com/office/drawing/2010/main" xmlns="" w="9525">
                     <a:solidFill>
                       <a:srgbClr val="000000"/>
                     </a:solidFill>
@@ -12402,7 +12402,7 @@
               </a:ln>
               <a:extLst>
                 <a:ext uri="{91240B29-F687-4f45-9708-019B960494DF}">
-                  <a14:hiddenLine xmlns="" xmlns:a14="http://schemas.microsoft.com/office/drawing/2010/main" w="9525">
+                  <a14:hiddenLine xmlns:a14="http://schemas.microsoft.com/office/drawing/2010/main" xmlns="" w="9525">
                     <a:solidFill>
                       <a:srgbClr val="000000"/>
                     </a:solidFill>
@@ -12492,7 +12492,7 @@
               </a:ln>
               <a:extLst>
                 <a:ext uri="{91240B29-F687-4f45-9708-019B960494DF}">
-                  <a14:hiddenLine xmlns="" xmlns:a14="http://schemas.microsoft.com/office/drawing/2010/main" w="9525">
+                  <a14:hiddenLine xmlns:a14="http://schemas.microsoft.com/office/drawing/2010/main" xmlns="" w="9525">
                     <a:solidFill>
                       <a:srgbClr val="000000"/>
                     </a:solidFill>
@@ -12526,7 +12526,7 @@
               </a:ln>
               <a:extLst>
                 <a:ext uri="{91240B29-F687-4f45-9708-019B960494DF}">
-                  <a14:hiddenLine xmlns="" xmlns:a14="http://schemas.microsoft.com/office/drawing/2010/main" w="9525">
+                  <a14:hiddenLine xmlns:a14="http://schemas.microsoft.com/office/drawing/2010/main" xmlns="" w="9525">
                     <a:solidFill>
                       <a:srgbClr val="000000"/>
                     </a:solidFill>
@@ -12666,7 +12666,7 @@
           <a:p>
             <a:fld id="{EC4347D3-4C9A-C240-8F14-750059DFEEB0}" type="datetimeFigureOut">
               <a:rPr lang="en-US" smtClean="0"/>
-              <a:t>3/17/23</a:t>
+              <a:t>1/2/25</a:t>
             </a:fld>
             <a:endParaRPr lang="en-US"/>
           </a:p>
@@ -13282,7 +13282,7 @@
         </p:blipFill>
         <p:spPr>
           <a:xfrm>
-            <a:off x="741133" y="1411616"/>
+            <a:off x="741133" y="1419567"/>
             <a:ext cx="5583045" cy="4032899"/>
           </a:xfrm>
           <a:prstGeom prst="rect">
@@ -21232,8 +21232,8 @@
           </a:p>
         </p:txBody>
       </p:sp>
-      <mc:AlternateContent xmlns:mc="http://schemas.openxmlformats.org/markup-compatibility/2006">
-        <mc:Choice xmlns:a14="http://schemas.microsoft.com/office/drawing/2010/main" Requires="a14">
+      <mc:AlternateContent xmlns:mc="http://schemas.openxmlformats.org/markup-compatibility/2006" xmlns:a14="http://schemas.microsoft.com/office/drawing/2010/main">
+        <mc:Choice Requires="a14">
           <p:sp>
             <p:nvSpPr>
               <p:cNvPr id="20" name="Content Placeholder 2">
@@ -21550,7 +21550,7 @@
             </p:txBody>
           </p:sp>
         </mc:Choice>
-        <mc:Fallback>
+        <mc:Fallback xmlns="">
           <p:sp>
             <p:nvSpPr>
               <p:cNvPr id="20" name="Content Placeholder 2">
@@ -22637,8 +22637,8 @@
           </a:p>
         </p:txBody>
       </p:sp>
-      <mc:AlternateContent xmlns:mc="http://schemas.openxmlformats.org/markup-compatibility/2006">
-        <mc:Choice xmlns:a14="http://schemas.microsoft.com/office/drawing/2010/main" Requires="a14">
+      <mc:AlternateContent xmlns:mc="http://schemas.openxmlformats.org/markup-compatibility/2006" xmlns:a14="http://schemas.microsoft.com/office/drawing/2010/main">
+        <mc:Choice Requires="a14">
           <p:sp>
             <p:nvSpPr>
               <p:cNvPr id="20" name="Content Placeholder 2">
@@ -22949,7 +22949,7 @@
             </p:txBody>
           </p:sp>
         </mc:Choice>
-        <mc:Fallback>
+        <mc:Fallback xmlns="">
           <p:sp>
             <p:nvSpPr>
               <p:cNvPr id="20" name="Content Placeholder 2">
@@ -22994,8 +22994,8 @@
           </p:sp>
         </mc:Fallback>
       </mc:AlternateContent>
-      <mc:AlternateContent xmlns:mc="http://schemas.openxmlformats.org/markup-compatibility/2006">
-        <mc:Choice xmlns:a14="http://schemas.microsoft.com/office/drawing/2010/main" Requires="a14">
+      <mc:AlternateContent xmlns:mc="http://schemas.openxmlformats.org/markup-compatibility/2006" xmlns:a14="http://schemas.microsoft.com/office/drawing/2010/main">
+        <mc:Choice Requires="a14">
           <p:sp>
             <p:nvSpPr>
               <p:cNvPr id="13" name="Content Placeholder 2">
@@ -23303,7 +23303,7 @@
             </p:txBody>
           </p:sp>
         </mc:Choice>
-        <mc:Fallback>
+        <mc:Fallback xmlns="">
           <p:sp>
             <p:nvSpPr>
               <p:cNvPr id="13" name="Content Placeholder 2">
@@ -23412,8 +23412,8 @@
           </a:p>
         </p:txBody>
       </p:sp>
-      <mc:AlternateContent xmlns:mc="http://schemas.openxmlformats.org/markup-compatibility/2006">
-        <mc:Choice xmlns:a14="http://schemas.microsoft.com/office/drawing/2010/main" Requires="a14">
+      <mc:AlternateContent xmlns:mc="http://schemas.openxmlformats.org/markup-compatibility/2006" xmlns:a14="http://schemas.microsoft.com/office/drawing/2010/main">
+        <mc:Choice Requires="a14">
           <p:sp>
             <p:nvSpPr>
               <p:cNvPr id="20" name="Content Placeholder 2">
@@ -23724,7 +23724,7 @@
             </p:txBody>
           </p:sp>
         </mc:Choice>
-        <mc:Fallback>
+        <mc:Fallback xmlns="">
           <p:sp>
             <p:nvSpPr>
               <p:cNvPr id="20" name="Content Placeholder 2">
@@ -23769,8 +23769,8 @@
           </p:sp>
         </mc:Fallback>
       </mc:AlternateContent>
-      <mc:AlternateContent xmlns:mc="http://schemas.openxmlformats.org/markup-compatibility/2006">
-        <mc:Choice xmlns:a14="http://schemas.microsoft.com/office/drawing/2010/main" Requires="a14">
+      <mc:AlternateContent xmlns:mc="http://schemas.openxmlformats.org/markup-compatibility/2006" xmlns:a14="http://schemas.microsoft.com/office/drawing/2010/main">
+        <mc:Choice Requires="a14">
           <p:sp>
             <p:nvSpPr>
               <p:cNvPr id="13" name="Content Placeholder 2">
@@ -24163,7 +24163,7 @@
             </p:txBody>
           </p:sp>
         </mc:Choice>
-        <mc:Fallback>
+        <mc:Fallback xmlns="">
           <p:sp>
             <p:nvSpPr>
               <p:cNvPr id="13" name="Content Placeholder 2">
@@ -24272,8 +24272,8 @@
           </a:p>
         </p:txBody>
       </p:sp>
-      <mc:AlternateContent xmlns:mc="http://schemas.openxmlformats.org/markup-compatibility/2006">
-        <mc:Choice xmlns:a14="http://schemas.microsoft.com/office/drawing/2010/main" Requires="a14">
+      <mc:AlternateContent xmlns:mc="http://schemas.openxmlformats.org/markup-compatibility/2006" xmlns:a14="http://schemas.microsoft.com/office/drawing/2010/main">
+        <mc:Choice Requires="a14">
           <p:sp>
             <p:nvSpPr>
               <p:cNvPr id="20" name="Content Placeholder 2">
@@ -24584,7 +24584,7 @@
             </p:txBody>
           </p:sp>
         </mc:Choice>
-        <mc:Fallback>
+        <mc:Fallback xmlns="">
           <p:sp>
             <p:nvSpPr>
               <p:cNvPr id="20" name="Content Placeholder 2">
@@ -24629,8 +24629,8 @@
           </p:sp>
         </mc:Fallback>
       </mc:AlternateContent>
-      <mc:AlternateContent xmlns:mc="http://schemas.openxmlformats.org/markup-compatibility/2006">
-        <mc:Choice xmlns:a14="http://schemas.microsoft.com/office/drawing/2010/main" Requires="a14">
+      <mc:AlternateContent xmlns:mc="http://schemas.openxmlformats.org/markup-compatibility/2006" xmlns:a14="http://schemas.microsoft.com/office/drawing/2010/main">
+        <mc:Choice Requires="a14">
           <p:sp>
             <p:nvSpPr>
               <p:cNvPr id="13" name="Content Placeholder 2">
@@ -25174,16 +25174,7 @@
                             </a:solidFill>
                             <a:latin typeface="Cambria Math" panose="02040503050406030204" pitchFamily="18" charset="0"/>
                           </a:rPr>
-                          <m:t>3</m:t>
-                        </m:r>
-                        <m:r>
-                          <a:rPr lang="en-US" sz="1600" b="0" i="1" smtClean="0">
-                            <a:solidFill>
-                              <a:sysClr val="windowText" lastClr="000000"/>
-                            </a:solidFill>
-                            <a:latin typeface="Cambria Math" panose="02040503050406030204" pitchFamily="18" charset="0"/>
-                          </a:rPr>
-                          <m:t>≤</m:t>
+                          <m:t>3≤</m:t>
                         </m:r>
                         <m:r>
                           <a:rPr lang="en-US" sz="1600" b="0" i="1" smtClean="0">
@@ -25230,7 +25221,7 @@
             </p:txBody>
           </p:sp>
         </mc:Choice>
-        <mc:Fallback>
+        <mc:Fallback xmlns="">
           <p:sp>
             <p:nvSpPr>
               <p:cNvPr id="13" name="Content Placeholder 2">
@@ -25491,8 +25482,8 @@
           </a:fontRef>
         </p:style>
       </p:cxnSp>
-      <mc:AlternateContent xmlns:mc="http://schemas.openxmlformats.org/markup-compatibility/2006">
-        <mc:Choice xmlns:a14="http://schemas.microsoft.com/office/drawing/2010/main" Requires="a14">
+      <mc:AlternateContent xmlns:mc="http://schemas.openxmlformats.org/markup-compatibility/2006" xmlns:a14="http://schemas.microsoft.com/office/drawing/2010/main">
+        <mc:Choice Requires="a14">
           <p:sp>
             <p:nvSpPr>
               <p:cNvPr id="17" name="Content Placeholder 2">
@@ -25748,7 +25739,7 @@
             </p:txBody>
           </p:sp>
         </mc:Choice>
-        <mc:Fallback>
+        <mc:Fallback xmlns="">
           <p:sp>
             <p:nvSpPr>
               <p:cNvPr id="17" name="Content Placeholder 2">
@@ -26208,8 +26199,8 @@
           </a:fontRef>
         </p:style>
       </p:cxnSp>
-      <mc:AlternateContent xmlns:mc="http://schemas.openxmlformats.org/markup-compatibility/2006">
-        <mc:Choice xmlns:a14="http://schemas.microsoft.com/office/drawing/2010/main" Requires="a14">
+      <mc:AlternateContent xmlns:mc="http://schemas.openxmlformats.org/markup-compatibility/2006" xmlns:a14="http://schemas.microsoft.com/office/drawing/2010/main">
+        <mc:Choice Requires="a14">
           <p:sp>
             <p:nvSpPr>
               <p:cNvPr id="34" name="Content Placeholder 2">
@@ -26459,7 +26450,7 @@
             </p:txBody>
           </p:sp>
         </mc:Choice>
-        <mc:Fallback>
+        <mc:Fallback xmlns="">
           <p:sp>
             <p:nvSpPr>
               <p:cNvPr id="34" name="Content Placeholder 2">
@@ -26568,8 +26559,8 @@
           </a:p>
         </p:txBody>
       </p:sp>
-      <mc:AlternateContent xmlns:mc="http://schemas.openxmlformats.org/markup-compatibility/2006">
-        <mc:Choice xmlns:a14="http://schemas.microsoft.com/office/drawing/2010/main" Requires="a14">
+      <mc:AlternateContent xmlns:mc="http://schemas.openxmlformats.org/markup-compatibility/2006" xmlns:a14="http://schemas.microsoft.com/office/drawing/2010/main">
+        <mc:Choice Requires="a14">
           <p:sp>
             <p:nvSpPr>
               <p:cNvPr id="20" name="Content Placeholder 2">
@@ -26880,7 +26871,7 @@
             </p:txBody>
           </p:sp>
         </mc:Choice>
-        <mc:Fallback>
+        <mc:Fallback xmlns="">
           <p:sp>
             <p:nvSpPr>
               <p:cNvPr id="20" name="Content Placeholder 2">
@@ -26925,8 +26916,8 @@
           </p:sp>
         </mc:Fallback>
       </mc:AlternateContent>
-      <mc:AlternateContent xmlns:mc="http://schemas.openxmlformats.org/markup-compatibility/2006">
-        <mc:Choice xmlns:a14="http://schemas.microsoft.com/office/drawing/2010/main" Requires="a14">
+      <mc:AlternateContent xmlns:mc="http://schemas.openxmlformats.org/markup-compatibility/2006" xmlns:a14="http://schemas.microsoft.com/office/drawing/2010/main">
+        <mc:Choice Requires="a14">
           <p:sp>
             <p:nvSpPr>
               <p:cNvPr id="13" name="Content Placeholder 2">
@@ -27526,7 +27517,7 @@
             </p:txBody>
           </p:sp>
         </mc:Choice>
-        <mc:Fallback>
+        <mc:Fallback xmlns="">
           <p:sp>
             <p:nvSpPr>
               <p:cNvPr id="13" name="Content Placeholder 2">
@@ -27783,8 +27774,8 @@
           </a:fontRef>
         </p:style>
       </p:cxnSp>
-      <mc:AlternateContent xmlns:mc="http://schemas.openxmlformats.org/markup-compatibility/2006">
-        <mc:Choice xmlns:a14="http://schemas.microsoft.com/office/drawing/2010/main" Requires="a14">
+      <mc:AlternateContent xmlns:mc="http://schemas.openxmlformats.org/markup-compatibility/2006" xmlns:a14="http://schemas.microsoft.com/office/drawing/2010/main">
+        <mc:Choice Requires="a14">
           <p:sp>
             <p:nvSpPr>
               <p:cNvPr id="17" name="Content Placeholder 2">
@@ -28040,7 +28031,7 @@
             </p:txBody>
           </p:sp>
         </mc:Choice>
-        <mc:Fallback>
+        <mc:Fallback xmlns="">
           <p:sp>
             <p:nvSpPr>
               <p:cNvPr id="17" name="Content Placeholder 2">
@@ -28809,8 +28800,8 @@
           </a:fontRef>
         </p:style>
       </p:cxnSp>
-      <mc:AlternateContent xmlns:mc="http://schemas.openxmlformats.org/markup-compatibility/2006">
-        <mc:Choice xmlns:a14="http://schemas.microsoft.com/office/drawing/2010/main" Requires="a14">
+      <mc:AlternateContent xmlns:mc="http://schemas.openxmlformats.org/markup-compatibility/2006" xmlns:a14="http://schemas.microsoft.com/office/drawing/2010/main">
+        <mc:Choice Requires="a14">
           <p:sp>
             <p:nvSpPr>
               <p:cNvPr id="26" name="Content Placeholder 2">
@@ -29066,7 +29057,7 @@
             </p:txBody>
           </p:sp>
         </mc:Choice>
-        <mc:Fallback>
+        <mc:Fallback xmlns="">
           <p:sp>
             <p:nvSpPr>
               <p:cNvPr id="26" name="Content Placeholder 2">
@@ -29265,8 +29256,8 @@
           </a:p>
         </p:txBody>
       </p:sp>
-      <mc:AlternateContent xmlns:mc="http://schemas.openxmlformats.org/markup-compatibility/2006">
-        <mc:Choice xmlns:a14="http://schemas.microsoft.com/office/drawing/2010/main" Requires="a14">
+      <mc:AlternateContent xmlns:mc="http://schemas.openxmlformats.org/markup-compatibility/2006" xmlns:a14="http://schemas.microsoft.com/office/drawing/2010/main">
+        <mc:Choice Requires="a14">
           <p:sp>
             <p:nvSpPr>
               <p:cNvPr id="20" name="Content Placeholder 2">
@@ -29577,7 +29568,7 @@
             </p:txBody>
           </p:sp>
         </mc:Choice>
-        <mc:Fallback>
+        <mc:Fallback xmlns="">
           <p:sp>
             <p:nvSpPr>
               <p:cNvPr id="20" name="Content Placeholder 2">
@@ -29622,8 +29613,8 @@
           </p:sp>
         </mc:Fallback>
       </mc:AlternateContent>
-      <mc:AlternateContent xmlns:mc="http://schemas.openxmlformats.org/markup-compatibility/2006">
-        <mc:Choice xmlns:a14="http://schemas.microsoft.com/office/drawing/2010/main" Requires="a14">
+      <mc:AlternateContent xmlns:mc="http://schemas.openxmlformats.org/markup-compatibility/2006" xmlns:a14="http://schemas.microsoft.com/office/drawing/2010/main">
+        <mc:Choice Requires="a14">
           <p:sp>
             <p:nvSpPr>
               <p:cNvPr id="13" name="Content Placeholder 2">
@@ -30223,7 +30214,7 @@
             </p:txBody>
           </p:sp>
         </mc:Choice>
-        <mc:Fallback>
+        <mc:Fallback xmlns="">
           <p:sp>
             <p:nvSpPr>
               <p:cNvPr id="13" name="Content Placeholder 2">
@@ -30268,8 +30259,8 @@
           </p:sp>
         </mc:Fallback>
       </mc:AlternateContent>
-      <mc:AlternateContent xmlns:mc="http://schemas.openxmlformats.org/markup-compatibility/2006">
-        <mc:Choice xmlns:a14="http://schemas.microsoft.com/office/drawing/2010/main" Requires="a14">
+      <mc:AlternateContent xmlns:mc="http://schemas.openxmlformats.org/markup-compatibility/2006" xmlns:a14="http://schemas.microsoft.com/office/drawing/2010/main">
+        <mc:Choice Requires="a14">
           <p:sp>
             <p:nvSpPr>
               <p:cNvPr id="34" name="Content Placeholder 2">
@@ -30563,7 +30554,7 @@
             </p:txBody>
           </p:sp>
         </mc:Choice>
-        <mc:Fallback>
+        <mc:Fallback xmlns="">
           <p:sp>
             <p:nvSpPr>
               <p:cNvPr id="34" name="Content Placeholder 2">
@@ -36898,8 +36889,8 @@
           </a:p>
         </p:txBody>
       </p:sp>
-      <mc:AlternateContent xmlns:mc="http://schemas.openxmlformats.org/markup-compatibility/2006">
-        <mc:Choice xmlns:a14="http://schemas.microsoft.com/office/drawing/2010/main" Requires="a14">
+      <mc:AlternateContent xmlns:mc="http://schemas.openxmlformats.org/markup-compatibility/2006" xmlns:a14="http://schemas.microsoft.com/office/drawing/2010/main">
+        <mc:Choice Requires="a14">
           <p:sp>
             <p:nvSpPr>
               <p:cNvPr id="13" name="Content Placeholder 2">
@@ -37177,7 +37168,7 @@
             </p:txBody>
           </p:sp>
         </mc:Choice>
-        <mc:Fallback>
+        <mc:Fallback xmlns="">
           <p:sp>
             <p:nvSpPr>
               <p:cNvPr id="13" name="Content Placeholder 2">
@@ -39848,7 +39839,7 @@
                 </a14:m>
                 <a:r>
                   <a:rPr lang="en-US" sz="2000" dirty="0"/>
-                  <a:t> memory (so no more than list A itself)</a:t>
+                  <a:t> memory (so no more than list A itself times a constant)</a:t>
                 </a:r>
               </a:p>
               <a:p>
@@ -42317,8 +42308,8 @@
           </a:prstGeom>
         </p:spPr>
       </p:pic>
-      <mc:AlternateContent xmlns:mc="http://schemas.openxmlformats.org/markup-compatibility/2006">
-        <mc:Choice xmlns:a14="http://schemas.microsoft.com/office/drawing/2010/main" Requires="a14">
+      <mc:AlternateContent xmlns:mc="http://schemas.openxmlformats.org/markup-compatibility/2006" xmlns:a14="http://schemas.microsoft.com/office/drawing/2010/main">
+        <mc:Choice Requires="a14">
           <p:sp>
             <p:nvSpPr>
               <p:cNvPr id="13" name="Content Placeholder 2">
@@ -42677,7 +42668,7 @@
             </p:txBody>
           </p:sp>
         </mc:Choice>
-        <mc:Fallback>
+        <mc:Fallback xmlns="">
           <p:sp>
             <p:nvSpPr>
               <p:cNvPr id="13" name="Content Placeholder 2">

</xml_diff>

<commit_message>
Adding seg tree homework
</commit_message>
<xml_diff>
--- a/slides/Trees-SegmentTrees.pptx
+++ b/slides/Trees-SegmentTrees.pptx
@@ -239,7 +239,7 @@
           <a:p>
             <a:fld id="{C5B45307-6ED4-B142-BD64-10F739779302}" type="datetimeFigureOut">
               <a:rPr lang="en-US" smtClean="0"/>
-              <a:t>2/5/25</a:t>
+              <a:t>2/10/25</a:t>
             </a:fld>
             <a:endParaRPr lang="en-US"/>
           </a:p>
@@ -899,7 +899,7 @@
           <a:noFill/>
           <a:extLst>
             <a:ext uri="{909E8E84-426E-40dd-AFC4-6F175D3DCCD1}">
-              <a14:hiddenFill xmlns="" xmlns:a14="http://schemas.microsoft.com/office/drawing/2010/main">
+              <a14:hiddenFill xmlns:a14="http://schemas.microsoft.com/office/drawing/2010/main" xmlns="">
                 <a:solidFill>
                   <a:srgbClr val="FFFFFF"/>
                 </a:solidFill>
@@ -958,7 +958,7 @@
             </a:ln>
             <a:extLst>
               <a:ext uri="{91240B29-F687-4f45-9708-019B960494DF}">
-                <a14:hiddenLine xmlns="" xmlns:a14="http://schemas.microsoft.com/office/drawing/2010/main" w="9525">
+                <a14:hiddenLine xmlns:a14="http://schemas.microsoft.com/office/drawing/2010/main" xmlns="" w="9525">
                   <a:solidFill>
                     <a:srgbClr val="000000"/>
                   </a:solidFill>
@@ -1048,7 +1048,7 @@
             </a:ln>
             <a:extLst>
               <a:ext uri="{91240B29-F687-4f45-9708-019B960494DF}">
-                <a14:hiddenLine xmlns="" xmlns:a14="http://schemas.microsoft.com/office/drawing/2010/main" w="9525">
+                <a14:hiddenLine xmlns:a14="http://schemas.microsoft.com/office/drawing/2010/main" xmlns="" w="9525">
                   <a:solidFill>
                     <a:srgbClr val="000000"/>
                   </a:solidFill>
@@ -1138,7 +1138,7 @@
             </a:ln>
             <a:extLst>
               <a:ext uri="{91240B29-F687-4f45-9708-019B960494DF}">
-                <a14:hiddenLine xmlns="" xmlns:a14="http://schemas.microsoft.com/office/drawing/2010/main" w="9525">
+                <a14:hiddenLine xmlns:a14="http://schemas.microsoft.com/office/drawing/2010/main" xmlns="" w="9525">
                   <a:solidFill>
                     <a:srgbClr val="000000"/>
                   </a:solidFill>
@@ -1172,7 +1172,7 @@
             </a:ln>
             <a:extLst>
               <a:ext uri="{91240B29-F687-4f45-9708-019B960494DF}">
-                <a14:hiddenLine xmlns="" xmlns:a14="http://schemas.microsoft.com/office/drawing/2010/main" w="9525">
+                <a14:hiddenLine xmlns:a14="http://schemas.microsoft.com/office/drawing/2010/main" xmlns="" w="9525">
                   <a:solidFill>
                     <a:srgbClr val="000000"/>
                   </a:solidFill>
@@ -1262,7 +1262,7 @@
             </a:ln>
             <a:extLst>
               <a:ext uri="{91240B29-F687-4f45-9708-019B960494DF}">
-                <a14:hiddenLine xmlns="" xmlns:a14="http://schemas.microsoft.com/office/drawing/2010/main" w="9525">
+                <a14:hiddenLine xmlns:a14="http://schemas.microsoft.com/office/drawing/2010/main" xmlns="" w="9525">
                   <a:solidFill>
                     <a:srgbClr val="000000"/>
                   </a:solidFill>
@@ -1324,7 +1324,7 @@
             </a:ln>
             <a:extLst>
               <a:ext uri="{91240B29-F687-4f45-9708-019B960494DF}">
-                <a14:hiddenLine xmlns="" xmlns:a14="http://schemas.microsoft.com/office/drawing/2010/main" w="9525">
+                <a14:hiddenLine xmlns:a14="http://schemas.microsoft.com/office/drawing/2010/main" xmlns="" w="9525">
                   <a:solidFill>
                     <a:srgbClr val="000000"/>
                   </a:solidFill>
@@ -1386,7 +1386,7 @@
             </a:ln>
             <a:extLst>
               <a:ext uri="{91240B29-F687-4f45-9708-019B960494DF}">
-                <a14:hiddenLine xmlns="" xmlns:a14="http://schemas.microsoft.com/office/drawing/2010/main" w="9525">
+                <a14:hiddenLine xmlns:a14="http://schemas.microsoft.com/office/drawing/2010/main" xmlns="" w="9525">
                   <a:solidFill>
                     <a:srgbClr val="000000"/>
                   </a:solidFill>
@@ -1476,7 +1476,7 @@
             </a:ln>
             <a:extLst>
               <a:ext uri="{91240B29-F687-4f45-9708-019B960494DF}">
-                <a14:hiddenLine xmlns="" xmlns:a14="http://schemas.microsoft.com/office/drawing/2010/main" w="9525">
+                <a14:hiddenLine xmlns:a14="http://schemas.microsoft.com/office/drawing/2010/main" xmlns="" w="9525">
                   <a:solidFill>
                     <a:srgbClr val="000000"/>
                   </a:solidFill>
@@ -1538,7 +1538,7 @@
             </a:ln>
             <a:extLst>
               <a:ext uri="{91240B29-F687-4f45-9708-019B960494DF}">
-                <a14:hiddenLine xmlns="" xmlns:a14="http://schemas.microsoft.com/office/drawing/2010/main" w="9525">
+                <a14:hiddenLine xmlns:a14="http://schemas.microsoft.com/office/drawing/2010/main" xmlns="" w="9525">
                   <a:solidFill>
                     <a:srgbClr val="000000"/>
                   </a:solidFill>
@@ -1600,7 +1600,7 @@
             </a:ln>
             <a:extLst>
               <a:ext uri="{91240B29-F687-4f45-9708-019B960494DF}">
-                <a14:hiddenLine xmlns="" xmlns:a14="http://schemas.microsoft.com/office/drawing/2010/main" w="9525">
+                <a14:hiddenLine xmlns:a14="http://schemas.microsoft.com/office/drawing/2010/main" xmlns="" w="9525">
                   <a:solidFill>
                     <a:srgbClr val="000000"/>
                   </a:solidFill>
@@ -1690,7 +1690,7 @@
             </a:ln>
             <a:extLst>
               <a:ext uri="{91240B29-F687-4f45-9708-019B960494DF}">
-                <a14:hiddenLine xmlns="" xmlns:a14="http://schemas.microsoft.com/office/drawing/2010/main" w="9525">
+                <a14:hiddenLine xmlns:a14="http://schemas.microsoft.com/office/drawing/2010/main" xmlns="" w="9525">
                   <a:solidFill>
                     <a:srgbClr val="000000"/>
                   </a:solidFill>
@@ -1780,7 +1780,7 @@
             </a:ln>
             <a:extLst>
               <a:ext uri="{91240B29-F687-4f45-9708-019B960494DF}">
-                <a14:hiddenLine xmlns="" xmlns:a14="http://schemas.microsoft.com/office/drawing/2010/main" w="9525">
+                <a14:hiddenLine xmlns:a14="http://schemas.microsoft.com/office/drawing/2010/main" xmlns="" w="9525">
                   <a:solidFill>
                     <a:srgbClr val="000000"/>
                   </a:solidFill>
@@ -1842,7 +1842,7 @@
             </a:ln>
             <a:extLst>
               <a:ext uri="{91240B29-F687-4f45-9708-019B960494DF}">
-                <a14:hiddenLine xmlns="" xmlns:a14="http://schemas.microsoft.com/office/drawing/2010/main" w="9525">
+                <a14:hiddenLine xmlns:a14="http://schemas.microsoft.com/office/drawing/2010/main" xmlns="" w="9525">
                   <a:solidFill>
                     <a:srgbClr val="000000"/>
                   </a:solidFill>
@@ -1952,7 +1952,7 @@
             </a:ln>
             <a:extLst>
               <a:ext uri="{91240B29-F687-4f45-9708-019B960494DF}">
-                <a14:hiddenLine xmlns="" xmlns:a14="http://schemas.microsoft.com/office/drawing/2010/main" w="9525">
+                <a14:hiddenLine xmlns:a14="http://schemas.microsoft.com/office/drawing/2010/main" xmlns="" w="9525">
                   <a:solidFill>
                     <a:srgbClr val="000000"/>
                   </a:solidFill>
@@ -2014,7 +2014,7 @@
             </a:ln>
             <a:extLst>
               <a:ext uri="{91240B29-F687-4f45-9708-019B960494DF}">
-                <a14:hiddenLine xmlns="" xmlns:a14="http://schemas.microsoft.com/office/drawing/2010/main" w="9525">
+                <a14:hiddenLine xmlns:a14="http://schemas.microsoft.com/office/drawing/2010/main" xmlns="" w="9525">
                   <a:solidFill>
                     <a:srgbClr val="000000"/>
                   </a:solidFill>
@@ -2104,7 +2104,7 @@
             </a:ln>
             <a:extLst>
               <a:ext uri="{91240B29-F687-4f45-9708-019B960494DF}">
-                <a14:hiddenLine xmlns="" xmlns:a14="http://schemas.microsoft.com/office/drawing/2010/main" w="9525">
+                <a14:hiddenLine xmlns:a14="http://schemas.microsoft.com/office/drawing/2010/main" xmlns="" w="9525">
                   <a:solidFill>
                     <a:srgbClr val="000000"/>
                   </a:solidFill>
@@ -2194,7 +2194,7 @@
             </a:ln>
             <a:extLst>
               <a:ext uri="{91240B29-F687-4f45-9708-019B960494DF}">
-                <a14:hiddenLine xmlns="" xmlns:a14="http://schemas.microsoft.com/office/drawing/2010/main" w="9525">
+                <a14:hiddenLine xmlns:a14="http://schemas.microsoft.com/office/drawing/2010/main" xmlns="" w="9525">
                   <a:solidFill>
                     <a:srgbClr val="000000"/>
                   </a:solidFill>
@@ -2256,7 +2256,7 @@
             </a:ln>
             <a:extLst>
               <a:ext uri="{91240B29-F687-4f45-9708-019B960494DF}">
-                <a14:hiddenLine xmlns="" xmlns:a14="http://schemas.microsoft.com/office/drawing/2010/main" w="9525">
+                <a14:hiddenLine xmlns:a14="http://schemas.microsoft.com/office/drawing/2010/main" xmlns="" w="9525">
                   <a:solidFill>
                     <a:srgbClr val="000000"/>
                   </a:solidFill>
@@ -2346,7 +2346,7 @@
             </a:ln>
             <a:extLst>
               <a:ext uri="{91240B29-F687-4f45-9708-019B960494DF}">
-                <a14:hiddenLine xmlns="" xmlns:a14="http://schemas.microsoft.com/office/drawing/2010/main" w="9525">
+                <a14:hiddenLine xmlns:a14="http://schemas.microsoft.com/office/drawing/2010/main" xmlns="" w="9525">
                   <a:solidFill>
                     <a:srgbClr val="000000"/>
                   </a:solidFill>
@@ -2436,7 +2436,7 @@
             </a:ln>
             <a:extLst>
               <a:ext uri="{91240B29-F687-4f45-9708-019B960494DF}">
-                <a14:hiddenLine xmlns="" xmlns:a14="http://schemas.microsoft.com/office/drawing/2010/main" w="9525">
+                <a14:hiddenLine xmlns:a14="http://schemas.microsoft.com/office/drawing/2010/main" xmlns="" w="9525">
                   <a:solidFill>
                     <a:srgbClr val="000000"/>
                   </a:solidFill>
@@ -2492,7 +2492,7 @@
             </a:ln>
             <a:extLst>
               <a:ext uri="{91240B29-F687-4f45-9708-019B960494DF}">
-                <a14:hiddenLine xmlns="" xmlns:a14="http://schemas.microsoft.com/office/drawing/2010/main" w="9525">
+                <a14:hiddenLine xmlns:a14="http://schemas.microsoft.com/office/drawing/2010/main" xmlns="" w="9525">
                   <a:solidFill>
                     <a:srgbClr val="000000"/>
                   </a:solidFill>
@@ -2582,7 +2582,7 @@
             </a:ln>
             <a:extLst>
               <a:ext uri="{91240B29-F687-4f45-9708-019B960494DF}">
-                <a14:hiddenLine xmlns="" xmlns:a14="http://schemas.microsoft.com/office/drawing/2010/main" w="9525">
+                <a14:hiddenLine xmlns:a14="http://schemas.microsoft.com/office/drawing/2010/main" xmlns="" w="9525">
                   <a:solidFill>
                     <a:srgbClr val="000000"/>
                   </a:solidFill>
@@ -2638,7 +2638,7 @@
             </a:ln>
             <a:extLst>
               <a:ext uri="{91240B29-F687-4f45-9708-019B960494DF}">
-                <a14:hiddenLine xmlns="" xmlns:a14="http://schemas.microsoft.com/office/drawing/2010/main" w="9525">
+                <a14:hiddenLine xmlns:a14="http://schemas.microsoft.com/office/drawing/2010/main" xmlns="" w="9525">
                   <a:solidFill>
                     <a:srgbClr val="000000"/>
                   </a:solidFill>
@@ -2728,7 +2728,7 @@
             </a:ln>
             <a:extLst>
               <a:ext uri="{91240B29-F687-4f45-9708-019B960494DF}">
-                <a14:hiddenLine xmlns="" xmlns:a14="http://schemas.microsoft.com/office/drawing/2010/main" w="9525">
+                <a14:hiddenLine xmlns:a14="http://schemas.microsoft.com/office/drawing/2010/main" xmlns="" w="9525">
                   <a:solidFill>
                     <a:srgbClr val="000000"/>
                   </a:solidFill>
@@ -2796,7 +2796,7 @@
             </a:ln>
             <a:extLst>
               <a:ext uri="{91240B29-F687-4f45-9708-019B960494DF}">
-                <a14:hiddenLine xmlns="" xmlns:a14="http://schemas.microsoft.com/office/drawing/2010/main" w="9525">
+                <a14:hiddenLine xmlns:a14="http://schemas.microsoft.com/office/drawing/2010/main" xmlns="" w="9525">
                   <a:solidFill>
                     <a:srgbClr val="000000"/>
                   </a:solidFill>
@@ -2886,7 +2886,7 @@
             </a:ln>
             <a:extLst>
               <a:ext uri="{91240B29-F687-4f45-9708-019B960494DF}">
-                <a14:hiddenLine xmlns="" xmlns:a14="http://schemas.microsoft.com/office/drawing/2010/main" w="9525">
+                <a14:hiddenLine xmlns:a14="http://schemas.microsoft.com/office/drawing/2010/main" xmlns="" w="9525">
                   <a:solidFill>
                     <a:srgbClr val="000000"/>
                   </a:solidFill>
@@ -2954,7 +2954,7 @@
             </a:ln>
             <a:extLst>
               <a:ext uri="{91240B29-F687-4f45-9708-019B960494DF}">
-                <a14:hiddenLine xmlns="" xmlns:a14="http://schemas.microsoft.com/office/drawing/2010/main" w="9525">
+                <a14:hiddenLine xmlns:a14="http://schemas.microsoft.com/office/drawing/2010/main" xmlns="" w="9525">
                   <a:solidFill>
                     <a:srgbClr val="000000"/>
                   </a:solidFill>
@@ -3044,7 +3044,7 @@
             </a:ln>
             <a:extLst>
               <a:ext uri="{91240B29-F687-4f45-9708-019B960494DF}">
-                <a14:hiddenLine xmlns="" xmlns:a14="http://schemas.microsoft.com/office/drawing/2010/main" w="9525">
+                <a14:hiddenLine xmlns:a14="http://schemas.microsoft.com/office/drawing/2010/main" xmlns="" w="9525">
                   <a:solidFill>
                     <a:srgbClr val="000000"/>
                   </a:solidFill>
@@ -3078,7 +3078,7 @@
             </a:ln>
             <a:extLst>
               <a:ext uri="{91240B29-F687-4f45-9708-019B960494DF}">
-                <a14:hiddenLine xmlns="" xmlns:a14="http://schemas.microsoft.com/office/drawing/2010/main" w="9525">
+                <a14:hiddenLine xmlns:a14="http://schemas.microsoft.com/office/drawing/2010/main" xmlns="" w="9525">
                   <a:solidFill>
                     <a:srgbClr val="000000"/>
                   </a:solidFill>
@@ -3168,7 +3168,7 @@
             </a:ln>
             <a:extLst>
               <a:ext uri="{91240B29-F687-4f45-9708-019B960494DF}">
-                <a14:hiddenLine xmlns="" xmlns:a14="http://schemas.microsoft.com/office/drawing/2010/main" w="9525">
+                <a14:hiddenLine xmlns:a14="http://schemas.microsoft.com/office/drawing/2010/main" xmlns="" w="9525">
                   <a:solidFill>
                     <a:srgbClr val="000000"/>
                   </a:solidFill>
@@ -3230,7 +3230,7 @@
             </a:ln>
             <a:extLst>
               <a:ext uri="{91240B29-F687-4f45-9708-019B960494DF}">
-                <a14:hiddenLine xmlns="" xmlns:a14="http://schemas.microsoft.com/office/drawing/2010/main" w="9525">
+                <a14:hiddenLine xmlns:a14="http://schemas.microsoft.com/office/drawing/2010/main" xmlns="" w="9525">
                   <a:solidFill>
                     <a:srgbClr val="000000"/>
                   </a:solidFill>
@@ -3292,7 +3292,7 @@
             </a:ln>
             <a:extLst>
               <a:ext uri="{91240B29-F687-4f45-9708-019B960494DF}">
-                <a14:hiddenLine xmlns="" xmlns:a14="http://schemas.microsoft.com/office/drawing/2010/main" w="9525">
+                <a14:hiddenLine xmlns:a14="http://schemas.microsoft.com/office/drawing/2010/main" xmlns="" w="9525">
                   <a:solidFill>
                     <a:srgbClr val="000000"/>
                   </a:solidFill>
@@ -3382,7 +3382,7 @@
             </a:ln>
             <a:extLst>
               <a:ext uri="{91240B29-F687-4f45-9708-019B960494DF}">
-                <a14:hiddenLine xmlns="" xmlns:a14="http://schemas.microsoft.com/office/drawing/2010/main" w="9525">
+                <a14:hiddenLine xmlns:a14="http://schemas.microsoft.com/office/drawing/2010/main" xmlns="" w="9525">
                   <a:solidFill>
                     <a:srgbClr val="000000"/>
                   </a:solidFill>
@@ -3450,7 +3450,7 @@
             </a:ln>
             <a:extLst>
               <a:ext uri="{91240B29-F687-4f45-9708-019B960494DF}">
-                <a14:hiddenLine xmlns="" xmlns:a14="http://schemas.microsoft.com/office/drawing/2010/main" w="9525">
+                <a14:hiddenLine xmlns:a14="http://schemas.microsoft.com/office/drawing/2010/main" xmlns="" w="9525">
                   <a:solidFill>
                     <a:srgbClr val="000000"/>
                   </a:solidFill>
@@ -3512,7 +3512,7 @@
             </a:ln>
             <a:extLst>
               <a:ext uri="{91240B29-F687-4f45-9708-019B960494DF}">
-                <a14:hiddenLine xmlns="" xmlns:a14="http://schemas.microsoft.com/office/drawing/2010/main" w="9525">
+                <a14:hiddenLine xmlns:a14="http://schemas.microsoft.com/office/drawing/2010/main" xmlns="" w="9525">
                   <a:solidFill>
                     <a:srgbClr val="000000"/>
                   </a:solidFill>
@@ -3602,7 +3602,7 @@
             </a:ln>
             <a:extLst>
               <a:ext uri="{91240B29-F687-4f45-9708-019B960494DF}">
-                <a14:hiddenLine xmlns="" xmlns:a14="http://schemas.microsoft.com/office/drawing/2010/main" w="9525">
+                <a14:hiddenLine xmlns:a14="http://schemas.microsoft.com/office/drawing/2010/main" xmlns="" w="9525">
                   <a:solidFill>
                     <a:srgbClr val="000000"/>
                   </a:solidFill>
@@ -3664,7 +3664,7 @@
             </a:ln>
             <a:extLst>
               <a:ext uri="{91240B29-F687-4f45-9708-019B960494DF}">
-                <a14:hiddenLine xmlns="" xmlns:a14="http://schemas.microsoft.com/office/drawing/2010/main" w="9525">
+                <a14:hiddenLine xmlns:a14="http://schemas.microsoft.com/office/drawing/2010/main" xmlns="" w="9525">
                   <a:solidFill>
                     <a:srgbClr val="000000"/>
                   </a:solidFill>
@@ -3754,7 +3754,7 @@
             </a:ln>
             <a:extLst>
               <a:ext uri="{91240B29-F687-4f45-9708-019B960494DF}">
-                <a14:hiddenLine xmlns="" xmlns:a14="http://schemas.microsoft.com/office/drawing/2010/main" w="9525">
+                <a14:hiddenLine xmlns:a14="http://schemas.microsoft.com/office/drawing/2010/main" xmlns="" w="9525">
                   <a:solidFill>
                     <a:srgbClr val="000000"/>
                   </a:solidFill>
@@ -3816,7 +3816,7 @@
             </a:ln>
             <a:extLst>
               <a:ext uri="{91240B29-F687-4f45-9708-019B960494DF}">
-                <a14:hiddenLine xmlns="" xmlns:a14="http://schemas.microsoft.com/office/drawing/2010/main" w="9525">
+                <a14:hiddenLine xmlns:a14="http://schemas.microsoft.com/office/drawing/2010/main" xmlns="" w="9525">
                   <a:solidFill>
                     <a:srgbClr val="000000"/>
                   </a:solidFill>
@@ -3906,7 +3906,7 @@
             </a:ln>
             <a:extLst>
               <a:ext uri="{91240B29-F687-4f45-9708-019B960494DF}">
-                <a14:hiddenLine xmlns="" xmlns:a14="http://schemas.microsoft.com/office/drawing/2010/main" w="9525">
+                <a14:hiddenLine xmlns:a14="http://schemas.microsoft.com/office/drawing/2010/main" xmlns="" w="9525">
                   <a:solidFill>
                     <a:srgbClr val="000000"/>
                   </a:solidFill>
@@ -3940,7 +3940,7 @@
             </a:ln>
             <a:extLst>
               <a:ext uri="{91240B29-F687-4f45-9708-019B960494DF}">
-                <a14:hiddenLine xmlns="" xmlns:a14="http://schemas.microsoft.com/office/drawing/2010/main" w="9525">
+                <a14:hiddenLine xmlns:a14="http://schemas.microsoft.com/office/drawing/2010/main" xmlns="" w="9525">
                   <a:solidFill>
                     <a:srgbClr val="000000"/>
                   </a:solidFill>
@@ -4005,7 +4005,7 @@
             </a:ln>
             <a:extLst>
               <a:ext uri="{91240B29-F687-4f45-9708-019B960494DF}">
-                <a14:hiddenLine xmlns="" xmlns:a14="http://schemas.microsoft.com/office/drawing/2010/main" w="9525">
+                <a14:hiddenLine xmlns:a14="http://schemas.microsoft.com/office/drawing/2010/main" xmlns="" w="9525">
                   <a:solidFill>
                     <a:srgbClr val="000000"/>
                   </a:solidFill>
@@ -4095,7 +4095,7 @@
             </a:ln>
             <a:extLst>
               <a:ext uri="{91240B29-F687-4f45-9708-019B960494DF}">
-                <a14:hiddenLine xmlns="" xmlns:a14="http://schemas.microsoft.com/office/drawing/2010/main" w="9525">
+                <a14:hiddenLine xmlns:a14="http://schemas.microsoft.com/office/drawing/2010/main" xmlns="" w="9525">
                   <a:solidFill>
                     <a:srgbClr val="000000"/>
                   </a:solidFill>
@@ -4157,7 +4157,7 @@
             </a:ln>
             <a:extLst>
               <a:ext uri="{91240B29-F687-4f45-9708-019B960494DF}">
-                <a14:hiddenLine xmlns="" xmlns:a14="http://schemas.microsoft.com/office/drawing/2010/main" w="9525">
+                <a14:hiddenLine xmlns:a14="http://schemas.microsoft.com/office/drawing/2010/main" xmlns="" w="9525">
                   <a:solidFill>
                     <a:srgbClr val="000000"/>
                   </a:solidFill>
@@ -4247,7 +4247,7 @@
             </a:ln>
             <a:extLst>
               <a:ext uri="{91240B29-F687-4f45-9708-019B960494DF}">
-                <a14:hiddenLine xmlns="" xmlns:a14="http://schemas.microsoft.com/office/drawing/2010/main" w="9525">
+                <a14:hiddenLine xmlns:a14="http://schemas.microsoft.com/office/drawing/2010/main" xmlns="" w="9525">
                   <a:solidFill>
                     <a:srgbClr val="000000"/>
                   </a:solidFill>
@@ -4337,7 +4337,7 @@
             </a:ln>
             <a:extLst>
               <a:ext uri="{91240B29-F687-4f45-9708-019B960494DF}">
-                <a14:hiddenLine xmlns="" xmlns:a14="http://schemas.microsoft.com/office/drawing/2010/main" w="9525">
+                <a14:hiddenLine xmlns:a14="http://schemas.microsoft.com/office/drawing/2010/main" xmlns="" w="9525">
                   <a:solidFill>
                     <a:srgbClr val="000000"/>
                   </a:solidFill>
@@ -4402,7 +4402,7 @@
             </a:ln>
             <a:extLst>
               <a:ext uri="{91240B29-F687-4f45-9708-019B960494DF}">
-                <a14:hiddenLine xmlns="" xmlns:a14="http://schemas.microsoft.com/office/drawing/2010/main" w="9525">
+                <a14:hiddenLine xmlns:a14="http://schemas.microsoft.com/office/drawing/2010/main" xmlns="" w="9525">
                   <a:solidFill>
                     <a:srgbClr val="000000"/>
                   </a:solidFill>
@@ -4464,7 +4464,7 @@
             </a:ln>
             <a:extLst>
               <a:ext uri="{91240B29-F687-4f45-9708-019B960494DF}">
-                <a14:hiddenLine xmlns="" xmlns:a14="http://schemas.microsoft.com/office/drawing/2010/main" w="9525">
+                <a14:hiddenLine xmlns:a14="http://schemas.microsoft.com/office/drawing/2010/main" xmlns="" w="9525">
                   <a:solidFill>
                     <a:srgbClr val="000000"/>
                   </a:solidFill>
@@ -4554,7 +4554,7 @@
             </a:ln>
             <a:extLst>
               <a:ext uri="{91240B29-F687-4f45-9708-019B960494DF}">
-                <a14:hiddenLine xmlns="" xmlns:a14="http://schemas.microsoft.com/office/drawing/2010/main" w="9525">
+                <a14:hiddenLine xmlns:a14="http://schemas.microsoft.com/office/drawing/2010/main" xmlns="" w="9525">
                   <a:solidFill>
                     <a:srgbClr val="000000"/>
                   </a:solidFill>
@@ -4644,7 +4644,7 @@
             </a:ln>
             <a:extLst>
               <a:ext uri="{91240B29-F687-4f45-9708-019B960494DF}">
-                <a14:hiddenLine xmlns="" xmlns:a14="http://schemas.microsoft.com/office/drawing/2010/main" w="9525">
+                <a14:hiddenLine xmlns:a14="http://schemas.microsoft.com/office/drawing/2010/main" xmlns="" w="9525">
                   <a:solidFill>
                     <a:srgbClr val="000000"/>
                   </a:solidFill>
@@ -4706,7 +4706,7 @@
             </a:ln>
             <a:extLst>
               <a:ext uri="{91240B29-F687-4f45-9708-019B960494DF}">
-                <a14:hiddenLine xmlns="" xmlns:a14="http://schemas.microsoft.com/office/drawing/2010/main" w="9525">
+                <a14:hiddenLine xmlns:a14="http://schemas.microsoft.com/office/drawing/2010/main" xmlns="" w="9525">
                   <a:solidFill>
                     <a:srgbClr val="000000"/>
                   </a:solidFill>
@@ -4826,7 +4826,7 @@
             </a:ln>
             <a:extLst>
               <a:ext uri="{91240B29-F687-4f45-9708-019B960494DF}">
-                <a14:hiddenLine xmlns="" xmlns:a14="http://schemas.microsoft.com/office/drawing/2010/main" w="9525">
+                <a14:hiddenLine xmlns:a14="http://schemas.microsoft.com/office/drawing/2010/main" xmlns="" w="9525">
                   <a:solidFill>
                     <a:srgbClr val="000000"/>
                   </a:solidFill>
@@ -4894,7 +4894,7 @@
             </a:ln>
             <a:extLst>
               <a:ext uri="{91240B29-F687-4f45-9708-019B960494DF}">
-                <a14:hiddenLine xmlns="" xmlns:a14="http://schemas.microsoft.com/office/drawing/2010/main" w="9525">
+                <a14:hiddenLine xmlns:a14="http://schemas.microsoft.com/office/drawing/2010/main" xmlns="" w="9525">
                   <a:solidFill>
                     <a:srgbClr val="000000"/>
                   </a:solidFill>
@@ -4984,7 +4984,7 @@
             </a:ln>
             <a:extLst>
               <a:ext uri="{91240B29-F687-4f45-9708-019B960494DF}">
-                <a14:hiddenLine xmlns="" xmlns:a14="http://schemas.microsoft.com/office/drawing/2010/main" w="9525">
+                <a14:hiddenLine xmlns:a14="http://schemas.microsoft.com/office/drawing/2010/main" xmlns="" w="9525">
                   <a:solidFill>
                     <a:srgbClr val="000000"/>
                   </a:solidFill>
@@ -5124,7 +5124,7 @@
           <a:p>
             <a:fld id="{EC4347D3-4C9A-C240-8F14-750059DFEEB0}" type="datetimeFigureOut">
               <a:rPr lang="en-US" smtClean="0"/>
-              <a:t>2/5/25</a:t>
+              <a:t>2/10/25</a:t>
             </a:fld>
             <a:endParaRPr lang="en-US"/>
           </a:p>
@@ -5391,7 +5391,7 @@
           <a:p>
             <a:fld id="{EC4347D3-4C9A-C240-8F14-750059DFEEB0}" type="datetimeFigureOut">
               <a:rPr lang="en-US" smtClean="0"/>
-              <a:t>2/5/25</a:t>
+              <a:t>2/10/25</a:t>
             </a:fld>
             <a:endParaRPr lang="en-US"/>
           </a:p>
@@ -5587,7 +5587,7 @@
           <a:p>
             <a:fld id="{EC4347D3-4C9A-C240-8F14-750059DFEEB0}" type="datetimeFigureOut">
               <a:rPr lang="en-US" smtClean="0"/>
-              <a:t>2/5/25</a:t>
+              <a:t>2/10/25</a:t>
             </a:fld>
             <a:endParaRPr lang="en-US"/>
           </a:p>
@@ -5850,7 +5850,7 @@
           <a:p>
             <a:fld id="{EC4347D3-4C9A-C240-8F14-750059DFEEB0}" type="datetimeFigureOut">
               <a:rPr lang="en-US" smtClean="0"/>
-              <a:t>2/5/25</a:t>
+              <a:t>2/10/25</a:t>
             </a:fld>
             <a:endParaRPr lang="en-US"/>
           </a:p>
@@ -6284,7 +6284,7 @@
           <a:p>
             <a:fld id="{EC4347D3-4C9A-C240-8F14-750059DFEEB0}" type="datetimeFigureOut">
               <a:rPr lang="en-US" smtClean="0"/>
-              <a:t>2/5/25</a:t>
+              <a:t>2/10/25</a:t>
             </a:fld>
             <a:endParaRPr lang="en-US"/>
           </a:p>
@@ -6830,7 +6830,7 @@
           <a:p>
             <a:fld id="{EC4347D3-4C9A-C240-8F14-750059DFEEB0}" type="datetimeFigureOut">
               <a:rPr lang="en-US" smtClean="0"/>
-              <a:t>2/5/25</a:t>
+              <a:t>2/10/25</a:t>
             </a:fld>
             <a:endParaRPr lang="en-US"/>
           </a:p>
@@ -7550,7 +7550,7 @@
           <a:p>
             <a:fld id="{EC4347D3-4C9A-C240-8F14-750059DFEEB0}" type="datetimeFigureOut">
               <a:rPr lang="en-US" smtClean="0"/>
-              <a:t>2/5/25</a:t>
+              <a:t>2/10/25</a:t>
             </a:fld>
             <a:endParaRPr lang="en-US"/>
           </a:p>
@@ -7720,7 +7720,7 @@
           <a:p>
             <a:fld id="{EC4347D3-4C9A-C240-8F14-750059DFEEB0}" type="datetimeFigureOut">
               <a:rPr lang="en-US" smtClean="0"/>
-              <a:t>2/5/25</a:t>
+              <a:t>2/10/25</a:t>
             </a:fld>
             <a:endParaRPr lang="en-US"/>
           </a:p>
@@ -7900,7 +7900,7 @@
           <a:p>
             <a:fld id="{EC4347D3-4C9A-C240-8F14-750059DFEEB0}" type="datetimeFigureOut">
               <a:rPr lang="en-US" smtClean="0"/>
-              <a:t>2/5/25</a:t>
+              <a:t>2/10/25</a:t>
             </a:fld>
             <a:endParaRPr lang="en-US"/>
           </a:p>
@@ -8070,7 +8070,7 @@
           <a:p>
             <a:fld id="{EC4347D3-4C9A-C240-8F14-750059DFEEB0}" type="datetimeFigureOut">
               <a:rPr lang="en-US" smtClean="0"/>
-              <a:t>2/5/25</a:t>
+              <a:t>2/10/25</a:t>
             </a:fld>
             <a:endParaRPr lang="en-US"/>
           </a:p>
@@ -8320,7 +8320,7 @@
           <a:p>
             <a:fld id="{EC4347D3-4C9A-C240-8F14-750059DFEEB0}" type="datetimeFigureOut">
               <a:rPr lang="en-US" smtClean="0"/>
-              <a:t>2/5/25</a:t>
+              <a:t>2/10/25</a:t>
             </a:fld>
             <a:endParaRPr lang="en-US"/>
           </a:p>
@@ -8552,7 +8552,7 @@
           <a:p>
             <a:fld id="{EC4347D3-4C9A-C240-8F14-750059DFEEB0}" type="datetimeFigureOut">
               <a:rPr lang="en-US" smtClean="0"/>
-              <a:t>2/5/25</a:t>
+              <a:t>2/10/25</a:t>
             </a:fld>
             <a:endParaRPr lang="en-US"/>
           </a:p>
@@ -8938,7 +8938,7 @@
           <a:p>
             <a:fld id="{EC4347D3-4C9A-C240-8F14-750059DFEEB0}" type="datetimeFigureOut">
               <a:rPr lang="en-US" smtClean="0"/>
-              <a:t>2/5/25</a:t>
+              <a:t>2/10/25</a:t>
             </a:fld>
             <a:endParaRPr lang="en-US"/>
           </a:p>
@@ -9061,7 +9061,7 @@
           <a:p>
             <a:fld id="{EC4347D3-4C9A-C240-8F14-750059DFEEB0}" type="datetimeFigureOut">
               <a:rPr lang="en-US" smtClean="0"/>
-              <a:t>2/5/25</a:t>
+              <a:t>2/10/25</a:t>
             </a:fld>
             <a:endParaRPr lang="en-US"/>
           </a:p>
@@ -9156,7 +9156,7 @@
           <a:p>
             <a:fld id="{EC4347D3-4C9A-C240-8F14-750059DFEEB0}" type="datetimeFigureOut">
               <a:rPr lang="en-US" smtClean="0"/>
-              <a:t>2/5/25</a:t>
+              <a:t>2/10/25</a:t>
             </a:fld>
             <a:endParaRPr lang="en-US"/>
           </a:p>
@@ -9405,7 +9405,7 @@
           <a:p>
             <a:fld id="{EC4347D3-4C9A-C240-8F14-750059DFEEB0}" type="datetimeFigureOut">
               <a:rPr lang="en-US" smtClean="0"/>
-              <a:t>2/5/25</a:t>
+              <a:t>2/10/25</a:t>
             </a:fld>
             <a:endParaRPr lang="en-US"/>
           </a:p>
@@ -9690,7 +9690,7 @@
           <a:p>
             <a:fld id="{EC4347D3-4C9A-C240-8F14-750059DFEEB0}" type="datetimeFigureOut">
               <a:rPr lang="en-US" smtClean="0"/>
-              <a:t>2/5/25</a:t>
+              <a:t>2/10/25</a:t>
             </a:fld>
             <a:endParaRPr lang="en-US"/>
           </a:p>
@@ -9813,7 +9813,7 @@
           <a:noFill/>
           <a:extLst>
             <a:ext uri="{909E8E84-426E-40dd-AFC4-6F175D3DCCD1}">
-              <a14:hiddenFill xmlns="" xmlns:a14="http://schemas.microsoft.com/office/drawing/2010/main">
+              <a14:hiddenFill xmlns:a14="http://schemas.microsoft.com/office/drawing/2010/main" xmlns="">
                 <a:solidFill>
                   <a:srgbClr val="FFFFFF"/>
                 </a:solidFill>
@@ -9887,7 +9887,7 @@
               </a:ln>
               <a:extLst>
                 <a:ext uri="{91240B29-F687-4f45-9708-019B960494DF}">
-                  <a14:hiddenLine xmlns="" xmlns:a14="http://schemas.microsoft.com/office/drawing/2010/main" w="9525">
+                  <a14:hiddenLine xmlns:a14="http://schemas.microsoft.com/office/drawing/2010/main" xmlns="" w="9525">
                     <a:solidFill>
                       <a:srgbClr val="000000"/>
                     </a:solidFill>
@@ -9977,7 +9977,7 @@
               </a:ln>
               <a:extLst>
                 <a:ext uri="{91240B29-F687-4f45-9708-019B960494DF}">
-                  <a14:hiddenLine xmlns="" xmlns:a14="http://schemas.microsoft.com/office/drawing/2010/main" w="9525">
+                  <a14:hiddenLine xmlns:a14="http://schemas.microsoft.com/office/drawing/2010/main" xmlns="" w="9525">
                     <a:solidFill>
                       <a:srgbClr val="000000"/>
                     </a:solidFill>
@@ -10067,7 +10067,7 @@
               </a:ln>
               <a:extLst>
                 <a:ext uri="{91240B29-F687-4f45-9708-019B960494DF}">
-                  <a14:hiddenLine xmlns="" xmlns:a14="http://schemas.microsoft.com/office/drawing/2010/main" w="9525">
+                  <a14:hiddenLine xmlns:a14="http://schemas.microsoft.com/office/drawing/2010/main" xmlns="" w="9525">
                     <a:solidFill>
                       <a:srgbClr val="000000"/>
                     </a:solidFill>
@@ -10129,7 +10129,7 @@
               </a:ln>
               <a:extLst>
                 <a:ext uri="{91240B29-F687-4f45-9708-019B960494DF}">
-                  <a14:hiddenLine xmlns="" xmlns:a14="http://schemas.microsoft.com/office/drawing/2010/main" w="9525">
+                  <a14:hiddenLine xmlns:a14="http://schemas.microsoft.com/office/drawing/2010/main" xmlns="" w="9525">
                     <a:solidFill>
                       <a:srgbClr val="000000"/>
                     </a:solidFill>
@@ -10219,7 +10219,7 @@
               </a:ln>
               <a:extLst>
                 <a:ext uri="{91240B29-F687-4f45-9708-019B960494DF}">
-                  <a14:hiddenLine xmlns="" xmlns:a14="http://schemas.microsoft.com/office/drawing/2010/main" w="9525">
+                  <a14:hiddenLine xmlns:a14="http://schemas.microsoft.com/office/drawing/2010/main" xmlns="" w="9525">
                     <a:solidFill>
                       <a:srgbClr val="000000"/>
                     </a:solidFill>
@@ -10281,7 +10281,7 @@
               </a:ln>
               <a:extLst>
                 <a:ext uri="{91240B29-F687-4f45-9708-019B960494DF}">
-                  <a14:hiddenLine xmlns="" xmlns:a14="http://schemas.microsoft.com/office/drawing/2010/main" w="9525">
+                  <a14:hiddenLine xmlns:a14="http://schemas.microsoft.com/office/drawing/2010/main" xmlns="" w="9525">
                     <a:solidFill>
                       <a:srgbClr val="000000"/>
                     </a:solidFill>
@@ -10343,7 +10343,7 @@
               </a:ln>
               <a:extLst>
                 <a:ext uri="{91240B29-F687-4f45-9708-019B960494DF}">
-                  <a14:hiddenLine xmlns="" xmlns:a14="http://schemas.microsoft.com/office/drawing/2010/main" w="9525">
+                  <a14:hiddenLine xmlns:a14="http://schemas.microsoft.com/office/drawing/2010/main" xmlns="" w="9525">
                     <a:solidFill>
                       <a:srgbClr val="000000"/>
                     </a:solidFill>
@@ -10433,7 +10433,7 @@
               </a:ln>
               <a:extLst>
                 <a:ext uri="{91240B29-F687-4f45-9708-019B960494DF}">
-                  <a14:hiddenLine xmlns="" xmlns:a14="http://schemas.microsoft.com/office/drawing/2010/main" w="9525">
+                  <a14:hiddenLine xmlns:a14="http://schemas.microsoft.com/office/drawing/2010/main" xmlns="" w="9525">
                     <a:solidFill>
                       <a:srgbClr val="000000"/>
                     </a:solidFill>
@@ -10523,7 +10523,7 @@
               </a:ln>
               <a:extLst>
                 <a:ext uri="{91240B29-F687-4f45-9708-019B960494DF}">
-                  <a14:hiddenLine xmlns="" xmlns:a14="http://schemas.microsoft.com/office/drawing/2010/main" w="9525">
+                  <a14:hiddenLine xmlns:a14="http://schemas.microsoft.com/office/drawing/2010/main" xmlns="" w="9525">
                     <a:solidFill>
                       <a:srgbClr val="000000"/>
                     </a:solidFill>
@@ -10585,7 +10585,7 @@
               </a:ln>
               <a:extLst>
                 <a:ext uri="{91240B29-F687-4f45-9708-019B960494DF}">
-                  <a14:hiddenLine xmlns="" xmlns:a14="http://schemas.microsoft.com/office/drawing/2010/main" w="9525">
+                  <a14:hiddenLine xmlns:a14="http://schemas.microsoft.com/office/drawing/2010/main" xmlns="" w="9525">
                     <a:solidFill>
                       <a:srgbClr val="000000"/>
                     </a:solidFill>
@@ -10695,7 +10695,7 @@
               </a:ln>
               <a:extLst>
                 <a:ext uri="{91240B29-F687-4f45-9708-019B960494DF}">
-                  <a14:hiddenLine xmlns="" xmlns:a14="http://schemas.microsoft.com/office/drawing/2010/main" w="9525">
+                  <a14:hiddenLine xmlns:a14="http://schemas.microsoft.com/office/drawing/2010/main" xmlns="" w="9525">
                     <a:solidFill>
                       <a:srgbClr val="000000"/>
                     </a:solidFill>
@@ -10779,7 +10779,7 @@
               </a:ln>
               <a:extLst>
                 <a:ext uri="{91240B29-F687-4f45-9708-019B960494DF}">
-                  <a14:hiddenLine xmlns="" xmlns:a14="http://schemas.microsoft.com/office/drawing/2010/main" w="9525">
+                  <a14:hiddenLine xmlns:a14="http://schemas.microsoft.com/office/drawing/2010/main" xmlns="" w="9525">
                     <a:solidFill>
                       <a:srgbClr val="000000"/>
                     </a:solidFill>
@@ -10841,7 +10841,7 @@
               </a:ln>
               <a:extLst>
                 <a:ext uri="{91240B29-F687-4f45-9708-019B960494DF}">
-                  <a14:hiddenLine xmlns="" xmlns:a14="http://schemas.microsoft.com/office/drawing/2010/main" w="9525">
+                  <a14:hiddenLine xmlns:a14="http://schemas.microsoft.com/office/drawing/2010/main" xmlns="" w="9525">
                     <a:solidFill>
                       <a:srgbClr val="000000"/>
                     </a:solidFill>
@@ -10903,7 +10903,7 @@
               </a:ln>
               <a:extLst>
                 <a:ext uri="{91240B29-F687-4f45-9708-019B960494DF}">
-                  <a14:hiddenLine xmlns="" xmlns:a14="http://schemas.microsoft.com/office/drawing/2010/main" w="9525">
+                  <a14:hiddenLine xmlns:a14="http://schemas.microsoft.com/office/drawing/2010/main" xmlns="" w="9525">
                     <a:solidFill>
                       <a:srgbClr val="000000"/>
                     </a:solidFill>
@@ -10993,7 +10993,7 @@
               </a:ln>
               <a:extLst>
                 <a:ext uri="{91240B29-F687-4f45-9708-019B960494DF}">
-                  <a14:hiddenLine xmlns="" xmlns:a14="http://schemas.microsoft.com/office/drawing/2010/main" w="9525">
+                  <a14:hiddenLine xmlns:a14="http://schemas.microsoft.com/office/drawing/2010/main" xmlns="" w="9525">
                     <a:solidFill>
                       <a:srgbClr val="000000"/>
                     </a:solidFill>
@@ -11027,7 +11027,7 @@
               </a:ln>
               <a:extLst>
                 <a:ext uri="{91240B29-F687-4f45-9708-019B960494DF}">
-                  <a14:hiddenLine xmlns="" xmlns:a14="http://schemas.microsoft.com/office/drawing/2010/main" w="9525">
+                  <a14:hiddenLine xmlns:a14="http://schemas.microsoft.com/office/drawing/2010/main" xmlns="" w="9525">
                     <a:solidFill>
                       <a:srgbClr val="000000"/>
                     </a:solidFill>
@@ -11092,7 +11092,7 @@
               </a:ln>
               <a:extLst>
                 <a:ext uri="{91240B29-F687-4f45-9708-019B960494DF}">
-                  <a14:hiddenLine xmlns="" xmlns:a14="http://schemas.microsoft.com/office/drawing/2010/main" w="9525">
+                  <a14:hiddenLine xmlns:a14="http://schemas.microsoft.com/office/drawing/2010/main" xmlns="" w="9525">
                     <a:solidFill>
                       <a:srgbClr val="000000"/>
                     </a:solidFill>
@@ -11182,7 +11182,7 @@
               </a:ln>
               <a:extLst>
                 <a:ext uri="{91240B29-F687-4f45-9708-019B960494DF}">
-                  <a14:hiddenLine xmlns="" xmlns:a14="http://schemas.microsoft.com/office/drawing/2010/main" w="9525">
+                  <a14:hiddenLine xmlns:a14="http://schemas.microsoft.com/office/drawing/2010/main" xmlns="" w="9525">
                     <a:solidFill>
                       <a:srgbClr val="000000"/>
                     </a:solidFill>
@@ -11244,7 +11244,7 @@
               </a:ln>
               <a:extLst>
                 <a:ext uri="{91240B29-F687-4f45-9708-019B960494DF}">
-                  <a14:hiddenLine xmlns="" xmlns:a14="http://schemas.microsoft.com/office/drawing/2010/main" w="9525">
+                  <a14:hiddenLine xmlns:a14="http://schemas.microsoft.com/office/drawing/2010/main" xmlns="" w="9525">
                     <a:solidFill>
                       <a:srgbClr val="000000"/>
                     </a:solidFill>
@@ -11334,7 +11334,7 @@
               </a:ln>
               <a:extLst>
                 <a:ext uri="{91240B29-F687-4f45-9708-019B960494DF}">
-                  <a14:hiddenLine xmlns="" xmlns:a14="http://schemas.microsoft.com/office/drawing/2010/main" w="9525">
+                  <a14:hiddenLine xmlns:a14="http://schemas.microsoft.com/office/drawing/2010/main" xmlns="" w="9525">
                     <a:solidFill>
                       <a:srgbClr val="000000"/>
                     </a:solidFill>
@@ -11399,7 +11399,7 @@
               </a:ln>
               <a:extLst>
                 <a:ext uri="{91240B29-F687-4f45-9708-019B960494DF}">
-                  <a14:hiddenLine xmlns="" xmlns:a14="http://schemas.microsoft.com/office/drawing/2010/main" w="9525">
+                  <a14:hiddenLine xmlns:a14="http://schemas.microsoft.com/office/drawing/2010/main" xmlns="" w="9525">
                     <a:solidFill>
                       <a:srgbClr val="000000"/>
                     </a:solidFill>
@@ -11461,7 +11461,7 @@
               </a:ln>
               <a:extLst>
                 <a:ext uri="{91240B29-F687-4f45-9708-019B960494DF}">
-                  <a14:hiddenLine xmlns="" xmlns:a14="http://schemas.microsoft.com/office/drawing/2010/main" w="9525">
+                  <a14:hiddenLine xmlns:a14="http://schemas.microsoft.com/office/drawing/2010/main" xmlns="" w="9525">
                     <a:solidFill>
                       <a:srgbClr val="000000"/>
                     </a:solidFill>
@@ -11551,7 +11551,7 @@
               </a:ln>
               <a:extLst>
                 <a:ext uri="{91240B29-F687-4f45-9708-019B960494DF}">
-                  <a14:hiddenLine xmlns="" xmlns:a14="http://schemas.microsoft.com/office/drawing/2010/main" w="9525">
+                  <a14:hiddenLine xmlns:a14="http://schemas.microsoft.com/office/drawing/2010/main" xmlns="" w="9525">
                     <a:solidFill>
                       <a:srgbClr val="000000"/>
                     </a:solidFill>
@@ -11641,7 +11641,7 @@
               </a:ln>
               <a:extLst>
                 <a:ext uri="{91240B29-F687-4f45-9708-019B960494DF}">
-                  <a14:hiddenLine xmlns="" xmlns:a14="http://schemas.microsoft.com/office/drawing/2010/main" w="9525">
+                  <a14:hiddenLine xmlns:a14="http://schemas.microsoft.com/office/drawing/2010/main" xmlns="" w="9525">
                     <a:solidFill>
                       <a:srgbClr val="000000"/>
                     </a:solidFill>
@@ -11706,7 +11706,7 @@
               </a:ln>
               <a:extLst>
                 <a:ext uri="{91240B29-F687-4f45-9708-019B960494DF}">
-                  <a14:hiddenLine xmlns="" xmlns:a14="http://schemas.microsoft.com/office/drawing/2010/main" w="9525">
+                  <a14:hiddenLine xmlns:a14="http://schemas.microsoft.com/office/drawing/2010/main" xmlns="" w="9525">
                     <a:solidFill>
                       <a:srgbClr val="000000"/>
                     </a:solidFill>
@@ -11826,7 +11826,7 @@
               </a:ln>
               <a:extLst>
                 <a:ext uri="{91240B29-F687-4f45-9708-019B960494DF}">
-                  <a14:hiddenLine xmlns="" xmlns:a14="http://schemas.microsoft.com/office/drawing/2010/main" w="9525">
+                  <a14:hiddenLine xmlns:a14="http://schemas.microsoft.com/office/drawing/2010/main" xmlns="" w="9525">
                     <a:solidFill>
                       <a:srgbClr val="000000"/>
                     </a:solidFill>
@@ -11907,7 +11907,7 @@
               </a:ln>
               <a:extLst>
                 <a:ext uri="{91240B29-F687-4f45-9708-019B960494DF}">
-                  <a14:hiddenLine xmlns="" xmlns:a14="http://schemas.microsoft.com/office/drawing/2010/main" w="9525">
+                  <a14:hiddenLine xmlns:a14="http://schemas.microsoft.com/office/drawing/2010/main" xmlns="" w="9525">
                     <a:solidFill>
                       <a:srgbClr val="000000"/>
                     </a:solidFill>
@@ -12022,7 +12022,7 @@
               </a:ln>
               <a:extLst>
                 <a:ext uri="{91240B29-F687-4f45-9708-019B960494DF}">
-                  <a14:hiddenLine xmlns="" xmlns:a14="http://schemas.microsoft.com/office/drawing/2010/main" w="9525">
+                  <a14:hiddenLine xmlns:a14="http://schemas.microsoft.com/office/drawing/2010/main" xmlns="" w="9525">
                     <a:solidFill>
                       <a:srgbClr val="000000"/>
                     </a:solidFill>
@@ -12112,7 +12112,7 @@
               </a:ln>
               <a:extLst>
                 <a:ext uri="{91240B29-F687-4f45-9708-019B960494DF}">
-                  <a14:hiddenLine xmlns="" xmlns:a14="http://schemas.microsoft.com/office/drawing/2010/main" w="9525">
+                  <a14:hiddenLine xmlns:a14="http://schemas.microsoft.com/office/drawing/2010/main" xmlns="" w="9525">
                     <a:solidFill>
                       <a:srgbClr val="000000"/>
                     </a:solidFill>
@@ -12177,7 +12177,7 @@
               </a:ln>
               <a:extLst>
                 <a:ext uri="{91240B29-F687-4f45-9708-019B960494DF}">
-                  <a14:hiddenLine xmlns="" xmlns:a14="http://schemas.microsoft.com/office/drawing/2010/main" w="9525">
+                  <a14:hiddenLine xmlns:a14="http://schemas.microsoft.com/office/drawing/2010/main" xmlns="" w="9525">
                     <a:solidFill>
                       <a:srgbClr val="000000"/>
                     </a:solidFill>
@@ -12267,7 +12267,7 @@
               </a:ln>
               <a:extLst>
                 <a:ext uri="{91240B29-F687-4f45-9708-019B960494DF}">
-                  <a14:hiddenLine xmlns="" xmlns:a14="http://schemas.microsoft.com/office/drawing/2010/main" w="9525">
+                  <a14:hiddenLine xmlns:a14="http://schemas.microsoft.com/office/drawing/2010/main" xmlns="" w="9525">
                     <a:solidFill>
                       <a:srgbClr val="000000"/>
                     </a:solidFill>
@@ -12335,7 +12335,7 @@
               </a:ln>
               <a:extLst>
                 <a:ext uri="{91240B29-F687-4f45-9708-019B960494DF}">
-                  <a14:hiddenLine xmlns="" xmlns:a14="http://schemas.microsoft.com/office/drawing/2010/main" w="9525">
+                  <a14:hiddenLine xmlns:a14="http://schemas.microsoft.com/office/drawing/2010/main" xmlns="" w="9525">
                     <a:solidFill>
                       <a:srgbClr val="000000"/>
                     </a:solidFill>
@@ -12425,7 +12425,7 @@
               </a:ln>
               <a:extLst>
                 <a:ext uri="{91240B29-F687-4f45-9708-019B960494DF}">
-                  <a14:hiddenLine xmlns="" xmlns:a14="http://schemas.microsoft.com/office/drawing/2010/main" w="9525">
+                  <a14:hiddenLine xmlns:a14="http://schemas.microsoft.com/office/drawing/2010/main" xmlns="" w="9525">
                     <a:solidFill>
                       <a:srgbClr val="000000"/>
                     </a:solidFill>
@@ -12493,7 +12493,7 @@
               </a:ln>
               <a:extLst>
                 <a:ext uri="{91240B29-F687-4f45-9708-019B960494DF}">
-                  <a14:hiddenLine xmlns="" xmlns:a14="http://schemas.microsoft.com/office/drawing/2010/main" w="9525">
+                  <a14:hiddenLine xmlns:a14="http://schemas.microsoft.com/office/drawing/2010/main" xmlns="" w="9525">
                     <a:solidFill>
                       <a:srgbClr val="000000"/>
                     </a:solidFill>
@@ -12583,7 +12583,7 @@
               </a:ln>
               <a:extLst>
                 <a:ext uri="{91240B29-F687-4f45-9708-019B960494DF}">
-                  <a14:hiddenLine xmlns="" xmlns:a14="http://schemas.microsoft.com/office/drawing/2010/main" w="9525">
+                  <a14:hiddenLine xmlns:a14="http://schemas.microsoft.com/office/drawing/2010/main" xmlns="" w="9525">
                     <a:solidFill>
                       <a:srgbClr val="000000"/>
                     </a:solidFill>
@@ -12617,7 +12617,7 @@
               </a:ln>
               <a:extLst>
                 <a:ext uri="{91240B29-F687-4f45-9708-019B960494DF}">
-                  <a14:hiddenLine xmlns="" xmlns:a14="http://schemas.microsoft.com/office/drawing/2010/main" w="9525">
+                  <a14:hiddenLine xmlns:a14="http://schemas.microsoft.com/office/drawing/2010/main" xmlns="" w="9525">
                     <a:solidFill>
                       <a:srgbClr val="000000"/>
                     </a:solidFill>
@@ -12757,7 +12757,7 @@
           <a:p>
             <a:fld id="{EC4347D3-4C9A-C240-8F14-750059DFEEB0}" type="datetimeFigureOut">
               <a:rPr lang="en-US" smtClean="0"/>
-              <a:t>2/5/25</a:t>
+              <a:t>2/10/25</a:t>
             </a:fld>
             <a:endParaRPr lang="en-US"/>
           </a:p>

</xml_diff>